<commit_message>
style: smart factory 설명 수정
</commit_message>
<xml_diff>
--- a/porfolio_kangjunwoo-010-5495-4551.pptx
+++ b/porfolio_kangjunwoo-010-5495-4551.pptx
@@ -19988,8 +19988,8 @@
         </p:nvGrpSpPr>
         <p:grpSpPr>
           <a:xfrm>
-            <a:off x="6114288" y="2773679"/>
-            <a:ext cx="2588895" cy="39370"/>
+            <a:off x="5640578" y="2773679"/>
+            <a:ext cx="2904724" cy="39370"/>
             <a:chOff x="6114288" y="2773679"/>
             <a:chExt cx="2588895" cy="39370"/>
           </a:xfrm>
@@ -20183,8 +20183,8 @@
         </p:nvSpPr>
         <p:spPr>
           <a:xfrm>
-            <a:off x="4330953" y="2486760"/>
-            <a:ext cx="3724910" cy="1708150"/>
+            <a:off x="3857242" y="2486760"/>
+            <a:ext cx="4905758" cy="1388201"/>
           </a:xfrm>
           <a:prstGeom prst="rect">
             <a:avLst/>
@@ -20225,7 +20225,7 @@
               </a:rPr>
               <a:t>project</a:t>
             </a:r>
-            <a:endParaRPr sz="1800">
+            <a:endParaRPr sz="1800" dirty="0">
               <a:latin typeface="Times New Roman"/>
               <a:cs typeface="Times New Roman"/>
             </a:endParaRPr>
@@ -20240,320 +20240,15 @@
               </a:spcBef>
             </a:pPr>
             <a:r>
-              <a:rPr sz="1400" spc="-10" dirty="0">
-                <a:latin typeface="Times New Roman"/>
-                <a:cs typeface="Times New Roman"/>
-              </a:rPr>
-              <a:t>A</a:t>
-            </a:r>
-            <a:r>
-              <a:rPr sz="1400" spc="-35" dirty="0">
-                <a:latin typeface="Times New Roman"/>
-                <a:cs typeface="Times New Roman"/>
-              </a:rPr>
-              <a:t> </a:t>
-            </a:r>
-            <a:r>
-              <a:rPr sz="1400" spc="-15" dirty="0">
-                <a:latin typeface="Times New Roman"/>
-                <a:cs typeface="Times New Roman"/>
-              </a:rPr>
-              <a:t>service</a:t>
-            </a:r>
-            <a:r>
-              <a:rPr sz="1400" spc="20" dirty="0">
-                <a:latin typeface="Times New Roman"/>
-                <a:cs typeface="Times New Roman"/>
-              </a:rPr>
-              <a:t> </a:t>
-            </a:r>
-            <a:r>
-              <a:rPr sz="1400" spc="-15" dirty="0">
-                <a:latin typeface="Times New Roman"/>
-                <a:cs typeface="Times New Roman"/>
-              </a:rPr>
-              <a:t>that</a:t>
-            </a:r>
-            <a:r>
-              <a:rPr sz="1400" spc="-10" dirty="0">
-                <a:latin typeface="Times New Roman"/>
-                <a:cs typeface="Times New Roman"/>
-              </a:rPr>
-              <a:t> </a:t>
-            </a:r>
-            <a:r>
-              <a:rPr sz="1400" spc="-5" dirty="0">
-                <a:latin typeface="Times New Roman"/>
-                <a:cs typeface="Times New Roman"/>
-              </a:rPr>
-              <a:t>detects</a:t>
-            </a:r>
-            <a:r>
-              <a:rPr sz="1400" spc="-30" dirty="0">
-                <a:latin typeface="Times New Roman"/>
-                <a:cs typeface="Times New Roman"/>
-              </a:rPr>
-              <a:t> </a:t>
-            </a:r>
-            <a:r>
-              <a:rPr sz="1400" spc="-15" dirty="0">
-                <a:latin typeface="Times New Roman"/>
-                <a:cs typeface="Times New Roman"/>
-              </a:rPr>
-              <a:t>defective</a:t>
-            </a:r>
-            <a:r>
-              <a:rPr sz="1400" spc="55" dirty="0">
-                <a:latin typeface="Times New Roman"/>
-                <a:cs typeface="Times New Roman"/>
-              </a:rPr>
-              <a:t> </a:t>
-            </a:r>
-            <a:r>
-              <a:rPr sz="1400" spc="-10" dirty="0">
-                <a:latin typeface="Times New Roman"/>
-                <a:cs typeface="Times New Roman"/>
-              </a:rPr>
-              <a:t>parts</a:t>
-            </a:r>
-            <a:r>
-              <a:rPr sz="1400" spc="-25" dirty="0">
-                <a:latin typeface="Times New Roman"/>
-                <a:cs typeface="Times New Roman"/>
-              </a:rPr>
-              <a:t> </a:t>
-            </a:r>
-            <a:r>
-              <a:rPr sz="1400" spc="-20" dirty="0">
-                <a:latin typeface="Times New Roman"/>
-                <a:cs typeface="Times New Roman"/>
-              </a:rPr>
-              <a:t>in</a:t>
-            </a:r>
-            <a:r>
-              <a:rPr sz="1400" spc="-10" dirty="0">
-                <a:latin typeface="Times New Roman"/>
-                <a:cs typeface="Times New Roman"/>
-              </a:rPr>
-              <a:t> </a:t>
-            </a:r>
-            <a:r>
-              <a:rPr sz="1400" spc="-5" dirty="0">
-                <a:latin typeface="Times New Roman"/>
-                <a:cs typeface="Times New Roman"/>
-              </a:rPr>
-              <a:t>steel</a:t>
-            </a:r>
-            <a:r>
-              <a:rPr sz="1400" spc="-45" dirty="0">
-                <a:latin typeface="Times New Roman"/>
-                <a:cs typeface="Times New Roman"/>
-              </a:rPr>
-              <a:t> </a:t>
-            </a:r>
-            <a:r>
-              <a:rPr sz="1400" spc="-20" dirty="0">
-                <a:latin typeface="Times New Roman"/>
-                <a:cs typeface="Times New Roman"/>
-              </a:rPr>
-              <a:t>images.</a:t>
-            </a:r>
-            <a:endParaRPr sz="1400">
-              <a:latin typeface="Times New Roman"/>
-              <a:cs typeface="Times New Roman"/>
-            </a:endParaRPr>
-          </a:p>
-          <a:p>
-            <a:pPr marL="12700">
-              <a:lnSpc>
-                <a:spcPts val="1595"/>
-              </a:lnSpc>
-              <a:spcBef>
-                <a:spcPts val="1325"/>
-              </a:spcBef>
-            </a:pPr>
-            <a:r>
-              <a:rPr sz="1400" spc="-5" dirty="0">
-                <a:latin typeface="Times New Roman"/>
-                <a:cs typeface="Times New Roman"/>
-              </a:rPr>
-              <a:t>We</a:t>
-            </a:r>
-            <a:r>
-              <a:rPr sz="1400" spc="-40" dirty="0">
-                <a:latin typeface="Times New Roman"/>
-                <a:cs typeface="Times New Roman"/>
-              </a:rPr>
-              <a:t> </a:t>
-            </a:r>
-            <a:r>
-              <a:rPr sz="1400" spc="-10" dirty="0">
-                <a:latin typeface="Times New Roman"/>
-                <a:cs typeface="Times New Roman"/>
-              </a:rPr>
-              <a:t>used</a:t>
-            </a:r>
-            <a:r>
-              <a:rPr sz="1400" spc="-40" dirty="0">
-                <a:latin typeface="Times New Roman"/>
-                <a:cs typeface="Times New Roman"/>
-              </a:rPr>
-              <a:t> </a:t>
-            </a:r>
-            <a:r>
-              <a:rPr sz="1400" spc="-15" dirty="0">
-                <a:latin typeface="Times New Roman"/>
-                <a:cs typeface="Times New Roman"/>
-              </a:rPr>
-              <a:t>our</a:t>
-            </a:r>
-            <a:r>
-              <a:rPr sz="1400" spc="-30" dirty="0">
-                <a:latin typeface="Times New Roman"/>
-                <a:cs typeface="Times New Roman"/>
-              </a:rPr>
-              <a:t> </a:t>
-            </a:r>
-            <a:r>
-              <a:rPr sz="1400" spc="-5" dirty="0">
-                <a:latin typeface="Times New Roman"/>
-                <a:cs typeface="Times New Roman"/>
-              </a:rPr>
-              <a:t>own</a:t>
-            </a:r>
-            <a:r>
-              <a:rPr sz="1400" spc="-40" dirty="0">
-                <a:latin typeface="Times New Roman"/>
-                <a:cs typeface="Times New Roman"/>
-              </a:rPr>
-              <a:t> </a:t>
-            </a:r>
-            <a:r>
-              <a:rPr sz="1400" spc="-10" dirty="0">
-                <a:latin typeface="Times New Roman"/>
-                <a:cs typeface="Times New Roman"/>
-              </a:rPr>
-              <a:t>defect</a:t>
-            </a:r>
-            <a:r>
-              <a:rPr sz="1400" spc="5" dirty="0">
-                <a:latin typeface="Times New Roman"/>
-                <a:cs typeface="Times New Roman"/>
-              </a:rPr>
-              <a:t> </a:t>
-            </a:r>
-            <a:r>
-              <a:rPr sz="1400" spc="-10" dirty="0">
-                <a:latin typeface="Times New Roman"/>
-                <a:cs typeface="Times New Roman"/>
-              </a:rPr>
-              <a:t>detection </a:t>
-            </a:r>
-            <a:r>
-              <a:rPr sz="1400" spc="-20" dirty="0">
-                <a:latin typeface="Times New Roman"/>
-                <a:cs typeface="Times New Roman"/>
-              </a:rPr>
-              <a:t>AI</a:t>
-            </a:r>
-            <a:r>
-              <a:rPr sz="1400" spc="-25" dirty="0">
-                <a:latin typeface="Times New Roman"/>
-                <a:cs typeface="Times New Roman"/>
-              </a:rPr>
-              <a:t> </a:t>
-            </a:r>
-            <a:r>
-              <a:rPr sz="1400" spc="-15" dirty="0">
-                <a:latin typeface="Times New Roman"/>
-                <a:cs typeface="Times New Roman"/>
-              </a:rPr>
-              <a:t>model</a:t>
-            </a:r>
-            <a:r>
-              <a:rPr sz="1400" spc="25" dirty="0">
-                <a:latin typeface="Times New Roman"/>
-                <a:cs typeface="Times New Roman"/>
-              </a:rPr>
-              <a:t> </a:t>
-            </a:r>
-            <a:r>
-              <a:rPr sz="1400" spc="-30" dirty="0">
-                <a:latin typeface="Times New Roman"/>
-                <a:cs typeface="Times New Roman"/>
-              </a:rPr>
-              <a:t>and</a:t>
-            </a:r>
-            <a:endParaRPr sz="1400">
-              <a:latin typeface="Times New Roman"/>
-              <a:cs typeface="Times New Roman"/>
-            </a:endParaRPr>
-          </a:p>
-          <a:p>
-            <a:pPr marL="12700">
-              <a:lnSpc>
-                <a:spcPts val="1595"/>
-              </a:lnSpc>
-            </a:pPr>
-            <a:r>
-              <a:rPr sz="1400" spc="-15" dirty="0">
-                <a:latin typeface="Times New Roman"/>
-                <a:cs typeface="Times New Roman"/>
-              </a:rPr>
-              <a:t>distributed</a:t>
-            </a:r>
-            <a:r>
-              <a:rPr sz="1400" spc="-20" dirty="0">
-                <a:latin typeface="Times New Roman"/>
-                <a:cs typeface="Times New Roman"/>
-              </a:rPr>
-              <a:t> it</a:t>
-            </a:r>
-            <a:r>
-              <a:rPr sz="1400" spc="5" dirty="0">
-                <a:latin typeface="Times New Roman"/>
-                <a:cs typeface="Times New Roman"/>
-              </a:rPr>
-              <a:t> </a:t>
-            </a:r>
-            <a:r>
-              <a:rPr sz="1400" dirty="0">
-                <a:latin typeface="Times New Roman"/>
-                <a:cs typeface="Times New Roman"/>
-              </a:rPr>
-              <a:t>as</a:t>
-            </a:r>
-            <a:r>
-              <a:rPr sz="1400" spc="-5" dirty="0">
-                <a:latin typeface="Times New Roman"/>
-                <a:cs typeface="Times New Roman"/>
-              </a:rPr>
-              <a:t> an</a:t>
-            </a:r>
-            <a:r>
-              <a:rPr sz="1400" spc="-20" dirty="0">
-                <a:latin typeface="Times New Roman"/>
-                <a:cs typeface="Times New Roman"/>
-              </a:rPr>
-              <a:t> </a:t>
-            </a:r>
-            <a:r>
-              <a:rPr sz="1400" spc="-5" dirty="0">
-                <a:latin typeface="Times New Roman"/>
-                <a:cs typeface="Times New Roman"/>
-              </a:rPr>
-              <a:t>app</a:t>
-            </a:r>
-            <a:r>
-              <a:rPr sz="1400" spc="-15" dirty="0">
-                <a:latin typeface="Times New Roman"/>
-                <a:cs typeface="Times New Roman"/>
-              </a:rPr>
-              <a:t> service.</a:t>
-            </a:r>
-            <a:endParaRPr sz="1400">
-              <a:latin typeface="Times New Roman"/>
-              <a:cs typeface="Times New Roman"/>
+              <a:rPr lang="ko-KR" altLang="en-US" sz="1400" spc="-10" dirty="0" smtClean="0">
+                <a:latin typeface="Times New Roman" panose="02020603050405020304" pitchFamily="18" charset="0"/>
+                <a:cs typeface="Times New Roman" panose="02020603050405020304" pitchFamily="18" charset="0"/>
+              </a:rPr>
+              <a:t>철강 이미지에서 불량인 부분을 찾아내는 서비스</a:t>
+            </a:r>
+            <a:endParaRPr lang="en-US" sz="1400" spc="-10" dirty="0" smtClean="0">
+              <a:latin typeface="Times New Roman" panose="02020603050405020304" pitchFamily="18" charset="0"/>
+              <a:cs typeface="Times New Roman" panose="02020603050405020304" pitchFamily="18" charset="0"/>
             </a:endParaRPr>
           </a:p>
           <a:p>
@@ -20562,103 +20257,103 @@
                 <a:spcPct val="100000"/>
               </a:lnSpc>
               <a:spcBef>
-                <a:spcPts val="1300"/>
+                <a:spcPts val="830"/>
               </a:spcBef>
             </a:pPr>
             <a:r>
-              <a:rPr sz="1400" spc="-10" dirty="0">
-                <a:latin typeface="Times New Roman"/>
-                <a:cs typeface="Times New Roman"/>
-              </a:rPr>
-              <a:t>Received</a:t>
-            </a:r>
-            <a:r>
-              <a:rPr sz="1400" spc="30" dirty="0">
-                <a:latin typeface="Times New Roman"/>
-                <a:cs typeface="Times New Roman"/>
-              </a:rPr>
-              <a:t> </a:t>
-            </a:r>
-            <a:r>
-              <a:rPr sz="1400" spc="-15" dirty="0">
-                <a:latin typeface="Times New Roman"/>
-                <a:cs typeface="Times New Roman"/>
-              </a:rPr>
-              <a:t>A+,</a:t>
-            </a:r>
-            <a:r>
-              <a:rPr sz="1400" spc="-30" dirty="0">
-                <a:latin typeface="Times New Roman"/>
-                <a:cs typeface="Times New Roman"/>
-              </a:rPr>
-              <a:t> </a:t>
-            </a:r>
-            <a:r>
-              <a:rPr sz="1400" spc="-20" dirty="0">
-                <a:latin typeface="Times New Roman"/>
-                <a:cs typeface="Times New Roman"/>
-              </a:rPr>
-              <a:t>silver</a:t>
-            </a:r>
-            <a:r>
-              <a:rPr sz="1400" spc="45" dirty="0">
-                <a:latin typeface="Times New Roman"/>
-                <a:cs typeface="Times New Roman"/>
-              </a:rPr>
-              <a:t> </a:t>
-            </a:r>
-            <a:r>
-              <a:rPr sz="1400" spc="-5" dirty="0">
-                <a:latin typeface="Times New Roman"/>
-                <a:cs typeface="Times New Roman"/>
-              </a:rPr>
-              <a:t>award</a:t>
-            </a:r>
-            <a:r>
-              <a:rPr sz="1400" spc="-15" dirty="0">
-                <a:latin typeface="Times New Roman"/>
-                <a:cs typeface="Times New Roman"/>
-              </a:rPr>
-              <a:t> out</a:t>
-            </a:r>
-            <a:r>
-              <a:rPr sz="1400" spc="-25" dirty="0">
-                <a:latin typeface="Times New Roman"/>
-                <a:cs typeface="Times New Roman"/>
-              </a:rPr>
-              <a:t> </a:t>
-            </a:r>
-            <a:r>
-              <a:rPr sz="1400" spc="-5" dirty="0">
-                <a:latin typeface="Times New Roman"/>
-                <a:cs typeface="Times New Roman"/>
-              </a:rPr>
-              <a:t>of</a:t>
-            </a:r>
-            <a:r>
-              <a:rPr sz="1400" spc="-30" dirty="0">
-                <a:latin typeface="Times New Roman"/>
-                <a:cs typeface="Times New Roman"/>
-              </a:rPr>
-              <a:t> 14</a:t>
-            </a:r>
-            <a:r>
-              <a:rPr sz="1400" spc="-45" dirty="0">
-                <a:latin typeface="Times New Roman"/>
-                <a:cs typeface="Times New Roman"/>
-              </a:rPr>
-              <a:t> </a:t>
-            </a:r>
-            <a:r>
-              <a:rPr sz="1400" spc="-15" dirty="0">
-                <a:latin typeface="Times New Roman"/>
-                <a:cs typeface="Times New Roman"/>
-              </a:rPr>
-              <a:t>teams</a:t>
-            </a:r>
-            <a:endParaRPr sz="1400">
-              <a:latin typeface="Times New Roman"/>
-              <a:cs typeface="Times New Roman"/>
+              <a:rPr lang="ko-KR" altLang="en-US" sz="1400" spc="-20" dirty="0" smtClean="0">
+                <a:latin typeface="Times New Roman" panose="02020603050405020304" pitchFamily="18" charset="0"/>
+                <a:cs typeface="Times New Roman" panose="02020603050405020304" pitchFamily="18" charset="0"/>
+              </a:rPr>
+              <a:t>자체 개발한 </a:t>
+            </a:r>
+            <a:r>
+              <a:rPr lang="en-US" altLang="ko-KR" sz="1400" spc="-20" dirty="0" smtClean="0">
+                <a:latin typeface="Times New Roman" panose="02020603050405020304" pitchFamily="18" charset="0"/>
+                <a:cs typeface="Times New Roman" panose="02020603050405020304" pitchFamily="18" charset="0"/>
+              </a:rPr>
+              <a:t>AI, JPA </a:t>
+            </a:r>
+            <a:r>
+              <a:rPr lang="ko-KR" altLang="en-US" sz="1400" spc="-20" dirty="0" smtClean="0">
+                <a:latin typeface="Times New Roman" panose="02020603050405020304" pitchFamily="18" charset="0"/>
+                <a:cs typeface="Times New Roman" panose="02020603050405020304" pitchFamily="18" charset="0"/>
+              </a:rPr>
+              <a:t>및 서버</a:t>
+            </a:r>
+            <a:r>
+              <a:rPr lang="en-US" altLang="ko-KR" sz="1400" spc="-20" dirty="0" smtClean="0">
+                <a:latin typeface="Times New Roman" panose="02020603050405020304" pitchFamily="18" charset="0"/>
+                <a:cs typeface="Times New Roman" panose="02020603050405020304" pitchFamily="18" charset="0"/>
+              </a:rPr>
+              <a:t>(</a:t>
+            </a:r>
+            <a:r>
+              <a:rPr lang="en-US" altLang="ko-KR" sz="1400" spc="-20" dirty="0" err="1" smtClean="0">
+                <a:latin typeface="Times New Roman" panose="02020603050405020304" pitchFamily="18" charset="0"/>
+                <a:cs typeface="Times New Roman" panose="02020603050405020304" pitchFamily="18" charset="0"/>
+              </a:rPr>
+              <a:t>docker</a:t>
+            </a:r>
+            <a:r>
+              <a:rPr lang="en-US" altLang="ko-KR" sz="1400" spc="-20" dirty="0" smtClean="0">
+                <a:latin typeface="Times New Roman" panose="02020603050405020304" pitchFamily="18" charset="0"/>
+                <a:cs typeface="Times New Roman" panose="02020603050405020304" pitchFamily="18" charset="0"/>
+              </a:rPr>
+              <a:t>), AWS ec2</a:t>
+            </a:r>
+            <a:r>
+              <a:rPr lang="ko-KR" altLang="en-US" sz="1400" spc="-20" dirty="0" smtClean="0">
+                <a:latin typeface="Times New Roman" panose="02020603050405020304" pitchFamily="18" charset="0"/>
+                <a:cs typeface="Times New Roman" panose="02020603050405020304" pitchFamily="18" charset="0"/>
+              </a:rPr>
+              <a:t>로 제작 및 배포함</a:t>
+            </a:r>
+            <a:r>
+              <a:rPr lang="en-US" altLang="ko-KR" sz="1400" spc="-20" dirty="0" smtClean="0">
+                <a:latin typeface="Times New Roman" panose="02020603050405020304" pitchFamily="18" charset="0"/>
+                <a:cs typeface="Times New Roman" panose="02020603050405020304" pitchFamily="18" charset="0"/>
+              </a:rPr>
+              <a:t>.</a:t>
+            </a:r>
+          </a:p>
+          <a:p>
+            <a:pPr marL="12700">
+              <a:lnSpc>
+                <a:spcPct val="150000"/>
+              </a:lnSpc>
+            </a:pPr>
+            <a:r>
+              <a:rPr lang="ko-KR" altLang="en-US" sz="1400" spc="-15" dirty="0" smtClean="0">
+                <a:latin typeface="Times New Roman" panose="02020603050405020304" pitchFamily="18" charset="0"/>
+                <a:cs typeface="Times New Roman" panose="02020603050405020304" pitchFamily="18" charset="0"/>
+              </a:rPr>
+              <a:t>은상 수상</a:t>
+            </a:r>
+            <a:r>
+              <a:rPr lang="en-US" altLang="ko-KR" sz="1400" spc="-15" dirty="0" smtClean="0">
+                <a:latin typeface="Times New Roman" panose="02020603050405020304" pitchFamily="18" charset="0"/>
+                <a:cs typeface="Times New Roman" panose="02020603050405020304" pitchFamily="18" charset="0"/>
+              </a:rPr>
+              <a:t>(52</a:t>
+            </a:r>
+            <a:r>
+              <a:rPr lang="ko-KR" altLang="en-US" sz="1400" spc="-15" dirty="0" smtClean="0">
+                <a:latin typeface="Times New Roman" panose="02020603050405020304" pitchFamily="18" charset="0"/>
+                <a:cs typeface="Times New Roman" panose="02020603050405020304" pitchFamily="18" charset="0"/>
+              </a:rPr>
+              <a:t>개 팀 중</a:t>
+            </a:r>
+            <a:r>
+              <a:rPr lang="en-US" altLang="ko-KR" sz="1400" spc="-15" dirty="0" smtClean="0">
+                <a:latin typeface="Times New Roman" panose="02020603050405020304" pitchFamily="18" charset="0"/>
+                <a:cs typeface="Times New Roman" panose="02020603050405020304" pitchFamily="18" charset="0"/>
+              </a:rPr>
+              <a:t>)</a:t>
+            </a:r>
+            <a:endParaRPr sz="1400" dirty="0">
+              <a:latin typeface="Times New Roman" panose="02020603050405020304" pitchFamily="18" charset="0"/>
+              <a:cs typeface="Times New Roman" panose="02020603050405020304" pitchFamily="18" charset="0"/>
             </a:endParaRPr>
           </a:p>
         </p:txBody>
@@ -20700,8 +20395,8 @@
         </p:nvSpPr>
         <p:spPr>
           <a:xfrm>
-            <a:off x="147015" y="55879"/>
-            <a:ext cx="1299210" cy="347345"/>
+            <a:off x="147014" y="55879"/>
+            <a:ext cx="1605585" cy="347345"/>
           </a:xfrm>
           <a:prstGeom prst="rect">
             <a:avLst/>
@@ -20751,7 +20446,7 @@
               </a:rPr>
               <a:t>01.</a:t>
             </a:r>
-            <a:endParaRPr sz="2100">
+            <a:endParaRPr sz="2100" dirty="0">
               <a:latin typeface="Arial MT"/>
               <a:cs typeface="Arial MT"/>
             </a:endParaRPr>
@@ -20768,7 +20463,7 @@
         </p:nvGraphicFramePr>
         <p:xfrm>
           <a:off x="4266501" y="975804"/>
-          <a:ext cx="4522470" cy="4018279"/>
+          <a:ext cx="4507865" cy="4008156"/>
         </p:xfrm>
         <a:graphic>
           <a:graphicData uri="http://schemas.openxmlformats.org/drawingml/2006/table">

</xml_diff>

<commit_message>
style: Project 1 Introduce 수정
글씨체를 통일해서 바꿔야하는데 뭘로 바꿔야할 지 모르겠음.
이미지가 깨져서 새로 추가
</commit_message>
<xml_diff>
--- a/porfolio_kangjunwoo-010-5495-4551.pptx
+++ b/porfolio_kangjunwoo-010-5495-4551.pptx
@@ -4358,7 +4358,7 @@
         </p:nvGraphicFramePr>
         <p:xfrm>
           <a:off x="4266501" y="975804"/>
-          <a:ext cx="4522470" cy="3838575"/>
+          <a:ext cx="4507865" cy="3828451"/>
         </p:xfrm>
         <a:graphic>
           <a:graphicData uri="http://schemas.openxmlformats.org/drawingml/2006/table">
@@ -20459,10 +20459,16 @@
           <p:cNvGraphicFramePr>
             <a:graphicFrameLocks noGrp="1"/>
           </p:cNvGraphicFramePr>
-          <p:nvPr/>
+          <p:nvPr>
+            <p:extLst>
+              <p:ext uri="{D42A27DB-BD31-4B8C-83A1-F6EECF244321}">
+                <p14:modId xmlns:p14="http://schemas.microsoft.com/office/powerpoint/2010/main" val="2075072423"/>
+              </p:ext>
+            </p:extLst>
+          </p:nvPr>
         </p:nvGraphicFramePr>
         <p:xfrm>
-          <a:off x="4266501" y="975804"/>
+          <a:off x="4266501" y="974725"/>
           <a:ext cx="4507865" cy="4008156"/>
         </p:xfrm>
         <a:graphic>
@@ -20503,62 +20509,62 @@
                       </a:pPr>
                       <a:r>
                         <a:rPr sz="1050" b="1" dirty="0">
-                          <a:latin typeface="Times New Roman"/>
+                          <a:latin typeface="+mj-lt"/>
                           <a:cs typeface="Times New Roman"/>
                         </a:rPr>
                         <a:t>Wo</a:t>
                       </a:r>
                       <a:r>
                         <a:rPr sz="1050" b="1" spc="10" dirty="0">
-                          <a:latin typeface="Times New Roman"/>
+                          <a:latin typeface="+mj-lt"/>
                           <a:cs typeface="Times New Roman"/>
                         </a:rPr>
                         <a:t>r</a:t>
                       </a:r>
                       <a:r>
                         <a:rPr sz="1050" b="1" dirty="0">
-                          <a:latin typeface="Times New Roman"/>
+                          <a:latin typeface="+mj-lt"/>
                           <a:cs typeface="Times New Roman"/>
                         </a:rPr>
                         <a:t>k</a:t>
                       </a:r>
                       <a:r>
                         <a:rPr sz="1050" b="1" spc="-105" dirty="0">
-                          <a:latin typeface="Times New Roman"/>
+                          <a:latin typeface="+mj-lt"/>
                           <a:cs typeface="Times New Roman"/>
                         </a:rPr>
                         <a:t> </a:t>
                       </a:r>
                       <a:r>
                         <a:rPr sz="1050" b="1" spc="-15" dirty="0">
-                          <a:latin typeface="Times New Roman"/>
+                          <a:latin typeface="+mj-lt"/>
                           <a:cs typeface="Times New Roman"/>
                         </a:rPr>
                         <a:t>p</a:t>
                       </a:r>
                       <a:r>
                         <a:rPr sz="1050" b="1" spc="10" dirty="0">
-                          <a:latin typeface="Times New Roman"/>
+                          <a:latin typeface="+mj-lt"/>
                           <a:cs typeface="Times New Roman"/>
                         </a:rPr>
                         <a:t>er</a:t>
                       </a:r>
                       <a:r>
                         <a:rPr sz="1050" b="1" spc="-10" dirty="0">
-                          <a:latin typeface="Times New Roman"/>
+                          <a:latin typeface="+mj-lt"/>
                           <a:cs typeface="Times New Roman"/>
                         </a:rPr>
                         <a:t>i</a:t>
                       </a:r>
                       <a:r>
                         <a:rPr sz="1050" b="1" dirty="0">
-                          <a:latin typeface="Times New Roman"/>
+                          <a:latin typeface="+mj-lt"/>
                           <a:cs typeface="Times New Roman"/>
                         </a:rPr>
                         <a:t>od</a:t>
                       </a:r>
                       <a:endParaRPr sz="1050">
-                        <a:latin typeface="Times New Roman"/>
+                        <a:latin typeface="+mj-lt"/>
                         <a:cs typeface="Times New Roman"/>
                       </a:endParaRPr>
                     </a:p>
@@ -20602,7 +20608,7 @@
                           <a:solidFill>
                             <a:srgbClr val="4471C4"/>
                           </a:solidFill>
-                          <a:latin typeface="Times New Roman"/>
+                          <a:latin typeface="+mj-lt"/>
                           <a:cs typeface="Times New Roman"/>
                         </a:rPr>
                         <a:t>2023.</a:t>
@@ -20612,7 +20618,7 @@
                           <a:solidFill>
                             <a:srgbClr val="4471C4"/>
                           </a:solidFill>
-                          <a:latin typeface="Times New Roman"/>
+                          <a:latin typeface="+mj-lt"/>
                           <a:cs typeface="Times New Roman"/>
                         </a:rPr>
                         <a:t> </a:t>
@@ -20622,7 +20628,7 @@
                           <a:solidFill>
                             <a:srgbClr val="4471C4"/>
                           </a:solidFill>
-                          <a:latin typeface="Times New Roman"/>
+                          <a:latin typeface="+mj-lt"/>
                           <a:cs typeface="Times New Roman"/>
                         </a:rPr>
                         <a:t>04</a:t>
@@ -20632,7 +20638,7 @@
                           <a:solidFill>
                             <a:srgbClr val="4471C4"/>
                           </a:solidFill>
-                          <a:latin typeface="Times New Roman"/>
+                          <a:latin typeface="+mj-lt"/>
                           <a:cs typeface="Times New Roman"/>
                         </a:rPr>
                         <a:t> </a:t>
@@ -20642,7 +20648,7 @@
                           <a:solidFill>
                             <a:srgbClr val="4471C4"/>
                           </a:solidFill>
-                          <a:latin typeface="Times New Roman"/>
+                          <a:latin typeface="+mj-lt"/>
                           <a:cs typeface="Times New Roman"/>
                         </a:rPr>
                         <a:t>~</a:t>
@@ -20652,7 +20658,7 @@
                           <a:solidFill>
                             <a:srgbClr val="4471C4"/>
                           </a:solidFill>
-                          <a:latin typeface="Times New Roman"/>
+                          <a:latin typeface="+mj-lt"/>
                           <a:cs typeface="Times New Roman"/>
                         </a:rPr>
                         <a:t> </a:t>
@@ -20662,7 +20668,7 @@
                           <a:solidFill>
                             <a:srgbClr val="4471C4"/>
                           </a:solidFill>
-                          <a:latin typeface="Times New Roman"/>
+                          <a:latin typeface="+mj-lt"/>
                           <a:cs typeface="Times New Roman"/>
                         </a:rPr>
                         <a:t>2023.</a:t>
@@ -20672,7 +20678,7 @@
                           <a:solidFill>
                             <a:srgbClr val="4471C4"/>
                           </a:solidFill>
-                          <a:latin typeface="Times New Roman"/>
+                          <a:latin typeface="+mj-lt"/>
                           <a:cs typeface="Times New Roman"/>
                         </a:rPr>
                         <a:t> </a:t>
@@ -20682,7 +20688,7 @@
                           <a:solidFill>
                             <a:srgbClr val="4471C4"/>
                           </a:solidFill>
-                          <a:latin typeface="Times New Roman"/>
+                          <a:latin typeface="+mj-lt"/>
                           <a:cs typeface="Times New Roman"/>
                         </a:rPr>
                         <a:t>11</a:t>
@@ -20692,7 +20698,7 @@
                           <a:solidFill>
                             <a:srgbClr val="4471C4"/>
                           </a:solidFill>
-                          <a:latin typeface="Times New Roman"/>
+                          <a:latin typeface="+mj-lt"/>
                           <a:cs typeface="Times New Roman"/>
                         </a:rPr>
                         <a:t> </a:t>
@@ -20702,7 +20708,7 @@
                           <a:solidFill>
                             <a:srgbClr val="4471C4"/>
                           </a:solidFill>
-                          <a:latin typeface="Times New Roman"/>
+                          <a:latin typeface="+mj-lt"/>
                           <a:cs typeface="Times New Roman"/>
                         </a:rPr>
                         <a:t>(7</a:t>
@@ -20712,23 +20718,33 @@
                           <a:solidFill>
                             <a:srgbClr val="4471C4"/>
                           </a:solidFill>
-                          <a:latin typeface="Times New Roman"/>
+                          <a:latin typeface="+mj-lt"/>
                           <a:cs typeface="Times New Roman"/>
                         </a:rPr>
                         <a:t> </a:t>
                       </a:r>
                       <a:r>
-                        <a:rPr sz="1050" spc="-10" dirty="0">
-                          <a:solidFill>
-                            <a:srgbClr val="4471C4"/>
-                          </a:solidFill>
-                          <a:latin typeface="Times New Roman"/>
-                          <a:cs typeface="Times New Roman"/>
-                        </a:rPr>
-                        <a:t>Months)</a:t>
-                      </a:r>
-                      <a:endParaRPr sz="1050">
-                        <a:latin typeface="Times New Roman"/>
+                        <a:rPr lang="ko-KR" altLang="en-US" sz="1050" spc="-10" dirty="0" smtClean="0">
+                          <a:solidFill>
+                            <a:srgbClr val="4471C4"/>
+                          </a:solidFill>
+                          <a:latin typeface="+mj-lt"/>
+                          <a:cs typeface="Times New Roman"/>
+                        </a:rPr>
+                        <a:t>개월</a:t>
+                      </a:r>
+                      <a:r>
+                        <a:rPr sz="1050" spc="-10" dirty="0" smtClean="0">
+                          <a:solidFill>
+                            <a:srgbClr val="4471C4"/>
+                          </a:solidFill>
+                          <a:latin typeface="+mj-lt"/>
+                          <a:cs typeface="Times New Roman"/>
+                        </a:rPr>
+                        <a:t>)</a:t>
+                      </a:r>
+                      <a:endParaRPr sz="1050" dirty="0">
+                        <a:latin typeface="+mj-lt"/>
                         <a:cs typeface="Times New Roman"/>
                       </a:endParaRPr>
                     </a:p>
@@ -20776,13 +20792,13 @@
                       </a:pPr>
                       <a:r>
                         <a:rPr sz="1050" b="1" spc="-5" dirty="0">
-                          <a:latin typeface="Times New Roman"/>
+                          <a:latin typeface="+mj-lt"/>
                           <a:cs typeface="Times New Roman"/>
                         </a:rPr>
                         <a:t>Members</a:t>
                       </a:r>
                       <a:endParaRPr sz="1050">
-                        <a:latin typeface="Times New Roman"/>
+                        <a:latin typeface="+mj-lt"/>
                         <a:cs typeface="Times New Roman"/>
                       </a:endParaRPr>
                     </a:p>
@@ -20822,21 +20838,41 @@
                         </a:spcBef>
                       </a:pPr>
                       <a:r>
-                        <a:rPr sz="1050" spc="-10" dirty="0">
-                          <a:solidFill>
-                            <a:srgbClr val="4471C4"/>
-                          </a:solidFill>
-                          <a:latin typeface="Times New Roman"/>
-                          <a:cs typeface="Times New Roman"/>
-                        </a:rPr>
-                        <a:t>Total</a:t>
-                      </a:r>
-                      <a:r>
-                        <a:rPr sz="1050" spc="-55" dirty="0">
-                          <a:solidFill>
-                            <a:srgbClr val="4471C4"/>
-                          </a:solidFill>
-                          <a:latin typeface="Times New Roman"/>
+                        <a:rPr lang="ko-KR" altLang="en-US" sz="1050" spc="-10" dirty="0" smtClean="0">
+                          <a:solidFill>
+                            <a:srgbClr val="4471C4"/>
+                          </a:solidFill>
+                          <a:latin typeface="+mj-lt"/>
+                          <a:cs typeface="Times New Roman"/>
+                        </a:rPr>
+                        <a:t>총 </a:t>
+                      </a:r>
+                      <a:r>
+                        <a:rPr lang="en-US" altLang="ko-KR" sz="1050" spc="-10" dirty="0" smtClean="0">
+                          <a:solidFill>
+                            <a:srgbClr val="4471C4"/>
+                          </a:solidFill>
+                          <a:latin typeface="+mj-lt"/>
+                          <a:cs typeface="Times New Roman"/>
+                        </a:rPr>
+                        <a:t>3</a:t>
+                      </a:r>
+                      <a:r>
+                        <a:rPr lang="ko-KR" altLang="en-US" sz="1050" spc="-10" dirty="0" smtClean="0">
+                          <a:solidFill>
+                            <a:srgbClr val="4471C4"/>
+                          </a:solidFill>
+                          <a:latin typeface="+mj-lt"/>
+                          <a:cs typeface="Times New Roman"/>
+                        </a:rPr>
+                        <a:t>명</a:t>
+                      </a:r>
+                      <a:r>
+                        <a:rPr sz="1050" spc="35" dirty="0" smtClean="0">
+                          <a:solidFill>
+                            <a:srgbClr val="4471C4"/>
+                          </a:solidFill>
+                          <a:latin typeface="+mj-lt"/>
                           <a:cs typeface="Times New Roman"/>
                         </a:rPr>
                         <a:t> </a:t>
@@ -20846,123 +20882,103 @@
                           <a:solidFill>
                             <a:srgbClr val="4471C4"/>
                           </a:solidFill>
-                          <a:latin typeface="Times New Roman"/>
-                          <a:cs typeface="Times New Roman"/>
-                        </a:rPr>
-                        <a:t>3</a:t>
-                      </a:r>
-                      <a:r>
-                        <a:rPr sz="1050" spc="-20" dirty="0">
-                          <a:solidFill>
-                            <a:srgbClr val="4471C4"/>
-                          </a:solidFill>
-                          <a:latin typeface="Times New Roman"/>
-                          <a:cs typeface="Times New Roman"/>
-                        </a:rPr>
-                        <a:t> people</a:t>
+                          <a:latin typeface="+mj-lt"/>
+                          <a:cs typeface="Times New Roman"/>
+                        </a:rPr>
+                        <a:t>(100%</a:t>
+                      </a:r>
+                      <a:r>
+                        <a:rPr sz="1050" spc="-35" dirty="0">
+                          <a:solidFill>
+                            <a:srgbClr val="4471C4"/>
+                          </a:solidFill>
+                          <a:latin typeface="+mj-lt"/>
+                          <a:cs typeface="Times New Roman"/>
+                        </a:rPr>
+                        <a:t> </a:t>
+                      </a:r>
+                      <a:r>
+                        <a:rPr lang="ko-KR" altLang="en-US" sz="1050" spc="-15" dirty="0" smtClean="0">
+                          <a:solidFill>
+                            <a:srgbClr val="4471C4"/>
+                          </a:solidFill>
+                          <a:latin typeface="+mj-lt"/>
+                          <a:cs typeface="Times New Roman"/>
+                        </a:rPr>
+                        <a:t>기여</a:t>
+                      </a:r>
+                      <a:r>
+                        <a:rPr sz="1050" spc="55" dirty="0" smtClean="0">
+                          <a:solidFill>
+                            <a:srgbClr val="4471C4"/>
+                          </a:solidFill>
+                          <a:latin typeface="+mj-lt"/>
+                          <a:cs typeface="Times New Roman"/>
+                        </a:rPr>
+                        <a:t> </a:t>
+                      </a:r>
+                      <a:r>
+                        <a:rPr sz="1050" spc="-15" dirty="0">
+                          <a:solidFill>
+                            <a:srgbClr val="4471C4"/>
+                          </a:solidFill>
+                          <a:latin typeface="+mj-lt"/>
+                          <a:cs typeface="Times New Roman"/>
+                        </a:rPr>
+                        <a:t>for</a:t>
                       </a:r>
                       <a:r>
                         <a:rPr sz="1050" spc="35" dirty="0">
                           <a:solidFill>
                             <a:srgbClr val="4471C4"/>
                           </a:solidFill>
-                          <a:latin typeface="Times New Roman"/>
+                          <a:latin typeface="+mj-lt"/>
                           <a:cs typeface="Times New Roman"/>
                         </a:rPr>
                         <a:t> </a:t>
                       </a:r>
                       <a:r>
-                        <a:rPr sz="1050" dirty="0">
-                          <a:solidFill>
-                            <a:srgbClr val="4471C4"/>
-                          </a:solidFill>
-                          <a:latin typeface="Times New Roman"/>
-                          <a:cs typeface="Times New Roman"/>
-                        </a:rPr>
-                        <a:t>(100%</a:t>
-                      </a:r>
-                      <a:r>
-                        <a:rPr sz="1050" spc="-35" dirty="0">
-                          <a:solidFill>
-                            <a:srgbClr val="4471C4"/>
-                          </a:solidFill>
-                          <a:latin typeface="Times New Roman"/>
-                          <a:cs typeface="Times New Roman"/>
-                        </a:rPr>
-                        <a:t> </a:t>
-                      </a:r>
-                      <a:r>
-                        <a:rPr sz="1050" spc="-15" dirty="0">
-                          <a:solidFill>
-                            <a:srgbClr val="4471C4"/>
-                          </a:solidFill>
-                          <a:latin typeface="Times New Roman"/>
-                          <a:cs typeface="Times New Roman"/>
-                        </a:rPr>
-                        <a:t>contribution</a:t>
-                      </a:r>
-                      <a:r>
-                        <a:rPr sz="1050" spc="55" dirty="0">
-                          <a:solidFill>
-                            <a:srgbClr val="4471C4"/>
-                          </a:solidFill>
-                          <a:latin typeface="Times New Roman"/>
-                          <a:cs typeface="Times New Roman"/>
-                        </a:rPr>
-                        <a:t> </a:t>
-                      </a:r>
-                      <a:r>
-                        <a:rPr sz="1050" spc="-15" dirty="0">
-                          <a:solidFill>
-                            <a:srgbClr val="4471C4"/>
-                          </a:solidFill>
-                          <a:latin typeface="Times New Roman"/>
-                          <a:cs typeface="Times New Roman"/>
-                        </a:rPr>
-                        <a:t>for</a:t>
-                      </a:r>
-                      <a:r>
-                        <a:rPr sz="1050" spc="35" dirty="0">
-                          <a:solidFill>
-                            <a:srgbClr val="4471C4"/>
-                          </a:solidFill>
-                          <a:latin typeface="Times New Roman"/>
-                          <a:cs typeface="Times New Roman"/>
-                        </a:rPr>
-                        <a:t> </a:t>
-                      </a:r>
-                      <a:r>
-                        <a:rPr sz="1050" dirty="0">
-                          <a:solidFill>
-                            <a:srgbClr val="4471C4"/>
-                          </a:solidFill>
-                          <a:latin typeface="Times New Roman"/>
-                          <a:cs typeface="Times New Roman"/>
-                        </a:rPr>
-                        <a:t>BE,</a:t>
-                      </a:r>
-                      <a:r>
-                        <a:rPr sz="1050" spc="-25" dirty="0">
-                          <a:solidFill>
-                            <a:srgbClr val="4471C4"/>
-                          </a:solidFill>
-                          <a:latin typeface="Times New Roman"/>
-                          <a:cs typeface="Times New Roman"/>
-                        </a:rPr>
-                        <a:t> </a:t>
-                      </a:r>
-                      <a:r>
-                        <a:rPr sz="1050" spc="-20" dirty="0">
-                          <a:solidFill>
-                            <a:srgbClr val="4471C4"/>
-                          </a:solidFill>
-                          <a:latin typeface="Times New Roman"/>
-                          <a:cs typeface="Times New Roman"/>
-                        </a:rPr>
-                        <a:t>FE)</a:t>
-                      </a:r>
-                      <a:endParaRPr sz="1050">
-                        <a:latin typeface="Times New Roman"/>
+                        <a:rPr lang="en-US" sz="1050" dirty="0" smtClean="0">
+                          <a:solidFill>
+                            <a:srgbClr val="4471C4"/>
+                          </a:solidFill>
+                          <a:latin typeface="+mj-lt"/>
+                          <a:cs typeface="Times New Roman"/>
+                        </a:rPr>
+                        <a:t>AI</a:t>
+                      </a:r>
+                      <a:r>
+                        <a:rPr lang="ko-KR" altLang="en-US" sz="1050" dirty="0" smtClean="0">
+                          <a:solidFill>
+                            <a:srgbClr val="4471C4"/>
+                          </a:solidFill>
+                          <a:latin typeface="+mj-lt"/>
+                          <a:cs typeface="Times New Roman"/>
+                        </a:rPr>
+                        <a:t>를 제외한 </a:t>
+                      </a:r>
+                      <a:r>
+                        <a:rPr lang="en-US" altLang="ko-KR" sz="1050" dirty="0" smtClean="0">
+                          <a:solidFill>
+                            <a:srgbClr val="4471C4"/>
+                          </a:solidFill>
+                          <a:latin typeface="+mj-lt"/>
+                          <a:cs typeface="Times New Roman"/>
+                        </a:rPr>
+                        <a:t>FE, BE</a:t>
+                      </a:r>
+                      <a:r>
+                        <a:rPr sz="1050" spc="-20" dirty="0" smtClean="0">
+                          <a:solidFill>
+                            <a:srgbClr val="4471C4"/>
+                          </a:solidFill>
+                          <a:latin typeface="+mj-lt"/>
+                          <a:cs typeface="Times New Roman"/>
+                        </a:rPr>
+                        <a:t>)</a:t>
+                      </a:r>
+                      <a:endParaRPr sz="1050" dirty="0">
+                        <a:latin typeface="+mj-lt"/>
                         <a:cs typeface="Times New Roman"/>
                       </a:endParaRPr>
                     </a:p>
@@ -21008,8 +21024,8 @@
                           <a:spcPts val="40"/>
                         </a:spcBef>
                       </a:pPr>
-                      <a:endParaRPr sz="1600">
-                        <a:latin typeface="Times New Roman"/>
+                      <a:endParaRPr sz="1600" dirty="0">
+                        <a:latin typeface="+mj-lt"/>
                         <a:cs typeface="Times New Roman"/>
                       </a:endParaRPr>
                     </a:p>
@@ -21021,13 +21037,13 @@
                       </a:pPr>
                       <a:r>
                         <a:rPr sz="1050" b="1" spc="-10" dirty="0">
-                          <a:latin typeface="Times New Roman"/>
+                          <a:latin typeface="+mj-lt"/>
                           <a:cs typeface="Times New Roman"/>
                         </a:rPr>
                         <a:t>Objective</a:t>
                       </a:r>
-                      <a:endParaRPr sz="1050">
-                        <a:latin typeface="Times New Roman"/>
+                      <a:endParaRPr sz="1050" dirty="0">
+                        <a:latin typeface="+mj-lt"/>
                         <a:cs typeface="Times New Roman"/>
                       </a:endParaRPr>
                     </a:p>
@@ -21066,8 +21082,8 @@
                           <a:spcPts val="40"/>
                         </a:spcBef>
                       </a:pPr>
-                      <a:endParaRPr sz="1050">
-                        <a:latin typeface="Times New Roman"/>
+                      <a:endParaRPr sz="1050" dirty="0">
+                        <a:latin typeface="+mj-lt"/>
                         <a:cs typeface="Times New Roman"/>
                       </a:endParaRPr>
                     </a:p>
@@ -21078,177 +21094,40 @@
                         </a:lnSpc>
                       </a:pPr>
                       <a:r>
-                        <a:rPr sz="1050" spc="-10" dirty="0">
-                          <a:solidFill>
-                            <a:srgbClr val="4471C4"/>
-                          </a:solidFill>
-                          <a:latin typeface="Times New Roman"/>
-                          <a:cs typeface="Times New Roman"/>
-                        </a:rPr>
-                        <a:t>Bringing</a:t>
-                      </a:r>
-                      <a:r>
-                        <a:rPr sz="1050" spc="45" dirty="0">
-                          <a:solidFill>
-                            <a:srgbClr val="4471C4"/>
-                          </a:solidFill>
-                          <a:latin typeface="Times New Roman"/>
-                          <a:cs typeface="Times New Roman"/>
-                        </a:rPr>
-                        <a:t> </a:t>
-                      </a:r>
-                      <a:r>
-                        <a:rPr sz="1050" spc="-10" dirty="0">
-                          <a:solidFill>
-                            <a:srgbClr val="4471C4"/>
-                          </a:solidFill>
-                          <a:latin typeface="Times New Roman"/>
-                          <a:cs typeface="Times New Roman"/>
-                        </a:rPr>
-                        <a:t>the</a:t>
-                      </a:r>
-                      <a:r>
-                        <a:rPr sz="1050" spc="-15" dirty="0">
-                          <a:solidFill>
-                            <a:srgbClr val="4471C4"/>
-                          </a:solidFill>
-                          <a:latin typeface="Times New Roman"/>
-                          <a:cs typeface="Times New Roman"/>
-                        </a:rPr>
-                        <a:t> </a:t>
-                      </a:r>
-                      <a:r>
-                        <a:rPr sz="1050" spc="-5" dirty="0">
-                          <a:solidFill>
-                            <a:srgbClr val="4471C4"/>
-                          </a:solidFill>
-                          <a:latin typeface="Times New Roman"/>
-                          <a:cs typeface="Times New Roman"/>
-                        </a:rPr>
-                        <a:t>capabilities</a:t>
-                      </a:r>
-                      <a:r>
-                        <a:rPr sz="1050" spc="-30" dirty="0">
-                          <a:solidFill>
-                            <a:srgbClr val="4471C4"/>
-                          </a:solidFill>
-                          <a:latin typeface="Times New Roman"/>
-                          <a:cs typeface="Times New Roman"/>
-                        </a:rPr>
-                        <a:t> </a:t>
-                      </a:r>
-                      <a:r>
-                        <a:rPr sz="1050" spc="-15" dirty="0">
-                          <a:solidFill>
-                            <a:srgbClr val="4471C4"/>
-                          </a:solidFill>
-                          <a:latin typeface="Times New Roman"/>
-                          <a:cs typeface="Times New Roman"/>
-                        </a:rPr>
-                        <a:t>needed</a:t>
-                      </a:r>
-                      <a:r>
-                        <a:rPr sz="1050" spc="45" dirty="0">
-                          <a:solidFill>
-                            <a:srgbClr val="4471C4"/>
-                          </a:solidFill>
-                          <a:latin typeface="Times New Roman"/>
-                          <a:cs typeface="Times New Roman"/>
-                        </a:rPr>
-                        <a:t> </a:t>
-                      </a:r>
-                      <a:r>
-                        <a:rPr sz="1050" spc="-5" dirty="0">
-                          <a:solidFill>
-                            <a:srgbClr val="4471C4"/>
-                          </a:solidFill>
-                          <a:latin typeface="Times New Roman"/>
-                          <a:cs typeface="Times New Roman"/>
-                        </a:rPr>
-                        <a:t>to</a:t>
-                      </a:r>
-                      <a:r>
-                        <a:rPr sz="1050" spc="-30" dirty="0">
-                          <a:solidFill>
-                            <a:srgbClr val="4471C4"/>
-                          </a:solidFill>
-                          <a:latin typeface="Times New Roman"/>
-                          <a:cs typeface="Times New Roman"/>
-                        </a:rPr>
-                        <a:t> </a:t>
-                      </a:r>
-                      <a:r>
-                        <a:rPr sz="1050" dirty="0">
-                          <a:solidFill>
-                            <a:srgbClr val="4471C4"/>
-                          </a:solidFill>
-                          <a:latin typeface="Times New Roman"/>
-                          <a:cs typeface="Times New Roman"/>
-                        </a:rPr>
-                        <a:t>areas</a:t>
-                      </a:r>
-                      <a:r>
-                        <a:rPr sz="1050" spc="-50" dirty="0">
-                          <a:solidFill>
-                            <a:srgbClr val="4471C4"/>
-                          </a:solidFill>
-                          <a:latin typeface="Times New Roman"/>
-                          <a:cs typeface="Times New Roman"/>
-                        </a:rPr>
-                        <a:t> </a:t>
-                      </a:r>
-                      <a:r>
-                        <a:rPr sz="1050" spc="-10" dirty="0">
-                          <a:solidFill>
-                            <a:srgbClr val="4471C4"/>
-                          </a:solidFill>
-                          <a:latin typeface="Times New Roman"/>
-                          <a:cs typeface="Times New Roman"/>
-                        </a:rPr>
-                        <a:t>of</a:t>
-                      </a:r>
-                      <a:r>
-                        <a:rPr sz="1050" dirty="0">
-                          <a:solidFill>
-                            <a:srgbClr val="4471C4"/>
-                          </a:solidFill>
-                          <a:latin typeface="Times New Roman"/>
-                          <a:cs typeface="Times New Roman"/>
-                        </a:rPr>
-                        <a:t> </a:t>
-                      </a:r>
-                      <a:r>
-                        <a:rPr sz="1050" spc="-10" dirty="0">
-                          <a:solidFill>
-                            <a:srgbClr val="4471C4"/>
-                          </a:solidFill>
-                          <a:latin typeface="Times New Roman"/>
-                          <a:cs typeface="Times New Roman"/>
-                        </a:rPr>
-                        <a:t>the</a:t>
-                      </a:r>
-                      <a:r>
-                        <a:rPr sz="1050" spc="-15" dirty="0">
-                          <a:solidFill>
-                            <a:srgbClr val="4471C4"/>
-                          </a:solidFill>
-                          <a:latin typeface="Times New Roman"/>
-                          <a:cs typeface="Times New Roman"/>
-                        </a:rPr>
-                        <a:t> </a:t>
-                      </a:r>
-                      <a:r>
-                        <a:rPr sz="1050" spc="-10" dirty="0">
-                          <a:solidFill>
-                            <a:srgbClr val="4471C4"/>
-                          </a:solidFill>
-                          <a:latin typeface="Times New Roman"/>
-                          <a:cs typeface="Times New Roman"/>
-                        </a:rPr>
-                        <a:t>factory</a:t>
-                      </a:r>
-                      <a:endParaRPr sz="1050">
-                        <a:latin typeface="Times New Roman"/>
+                        <a:rPr lang="ko-KR" altLang="en-US" sz="1050" spc="-10" dirty="0" smtClean="0">
+                          <a:solidFill>
+                            <a:srgbClr val="4471C4"/>
+                          </a:solidFill>
+                          <a:latin typeface="+mj-lt"/>
+                          <a:cs typeface="Times New Roman"/>
+                        </a:rPr>
+                        <a:t>데이터의 불균형을 해결하는 </a:t>
+                      </a:r>
+                      <a:r>
+                        <a:rPr lang="en-US" altLang="ko-KR" sz="1050" spc="-10" dirty="0" smtClean="0">
+                          <a:solidFill>
+                            <a:srgbClr val="4471C4"/>
+                          </a:solidFill>
+                          <a:latin typeface="+mj-lt"/>
+                          <a:cs typeface="Times New Roman"/>
+                        </a:rPr>
+                        <a:t>AI </a:t>
+                      </a:r>
+                      <a:r>
+                        <a:rPr lang="ko-KR" altLang="en-US" sz="1050" spc="-10" dirty="0" smtClean="0">
+                          <a:solidFill>
+                            <a:srgbClr val="4471C4"/>
+                          </a:solidFill>
+                          <a:latin typeface="+mj-lt"/>
+                          <a:cs typeface="Times New Roman"/>
+                        </a:rPr>
+                        <a:t>모델을 개발하고 </a:t>
+                      </a:r>
+                      <a:endParaRPr lang="en-US" altLang="ko-KR" sz="1050" spc="-10" dirty="0" smtClean="0">
+                        <a:solidFill>
+                          <a:srgbClr val="4471C4"/>
+                        </a:solidFill>
+                        <a:latin typeface="+mj-lt"/>
                         <a:cs typeface="Times New Roman"/>
                       </a:endParaRPr>
                     </a:p>
@@ -21259,217 +21138,57 @@
                         </a:lnSpc>
                       </a:pPr>
                       <a:r>
-                        <a:rPr sz="1050" spc="-15" dirty="0">
-                          <a:solidFill>
-                            <a:srgbClr val="4471C4"/>
-                          </a:solidFill>
-                          <a:latin typeface="Times New Roman"/>
-                          <a:cs typeface="Times New Roman"/>
-                        </a:rPr>
-                        <a:t>industry</a:t>
-                      </a:r>
-                      <a:r>
-                        <a:rPr sz="1050" spc="50" dirty="0">
-                          <a:solidFill>
-                            <a:srgbClr val="4471C4"/>
-                          </a:solidFill>
-                          <a:latin typeface="Times New Roman"/>
-                          <a:cs typeface="Times New Roman"/>
-                        </a:rPr>
-                        <a:t> </a:t>
-                      </a:r>
-                      <a:r>
-                        <a:rPr sz="1050" spc="-10" dirty="0">
-                          <a:solidFill>
-                            <a:srgbClr val="4471C4"/>
-                          </a:solidFill>
-                          <a:latin typeface="Times New Roman"/>
-                          <a:cs typeface="Times New Roman"/>
-                        </a:rPr>
-                        <a:t>where</a:t>
-                      </a:r>
-                      <a:r>
-                        <a:rPr sz="1050" spc="-85" dirty="0">
-                          <a:solidFill>
-                            <a:srgbClr val="4471C4"/>
-                          </a:solidFill>
-                          <a:latin typeface="Times New Roman"/>
-                          <a:cs typeface="Times New Roman"/>
-                        </a:rPr>
-                        <a:t> </a:t>
-                      </a:r>
-                      <a:r>
-                        <a:rPr sz="1050" spc="-10" dirty="0">
-                          <a:solidFill>
-                            <a:srgbClr val="4471C4"/>
-                          </a:solidFill>
-                          <a:latin typeface="Times New Roman"/>
-                          <a:cs typeface="Times New Roman"/>
-                        </a:rPr>
-                        <a:t>AI</a:t>
-                      </a:r>
-                      <a:r>
-                        <a:rPr sz="1050" spc="10" dirty="0">
-                          <a:solidFill>
-                            <a:srgbClr val="4471C4"/>
-                          </a:solidFill>
-                          <a:latin typeface="Times New Roman"/>
-                          <a:cs typeface="Times New Roman"/>
-                        </a:rPr>
-                        <a:t> </a:t>
-                      </a:r>
-                      <a:r>
-                        <a:rPr sz="1050" spc="-5" dirty="0">
-                          <a:solidFill>
-                            <a:srgbClr val="4471C4"/>
-                          </a:solidFill>
-                          <a:latin typeface="Times New Roman"/>
-                          <a:cs typeface="Times New Roman"/>
-                        </a:rPr>
-                        <a:t>is</a:t>
-                      </a:r>
-                      <a:r>
-                        <a:rPr sz="1050" spc="-30" dirty="0">
-                          <a:solidFill>
-                            <a:srgbClr val="4471C4"/>
-                          </a:solidFill>
-                          <a:latin typeface="Times New Roman"/>
-                          <a:cs typeface="Times New Roman"/>
-                        </a:rPr>
-                        <a:t> </a:t>
-                      </a:r>
-                      <a:r>
-                        <a:rPr sz="1050" spc="-15" dirty="0">
-                          <a:solidFill>
-                            <a:srgbClr val="4471C4"/>
-                          </a:solidFill>
-                          <a:latin typeface="Times New Roman"/>
-                          <a:cs typeface="Times New Roman"/>
-                        </a:rPr>
-                        <a:t>needed</a:t>
-                      </a:r>
-                      <a:r>
-                        <a:rPr sz="1050" spc="55" dirty="0">
-                          <a:solidFill>
-                            <a:srgbClr val="4471C4"/>
-                          </a:solidFill>
-                          <a:latin typeface="Times New Roman"/>
-                          <a:cs typeface="Times New Roman"/>
-                        </a:rPr>
-                        <a:t> </a:t>
-                      </a:r>
-                      <a:r>
-                        <a:rPr sz="1050" spc="-20" dirty="0">
-                          <a:solidFill>
-                            <a:srgbClr val="4471C4"/>
-                          </a:solidFill>
-                          <a:latin typeface="Times New Roman"/>
-                          <a:cs typeface="Times New Roman"/>
-                        </a:rPr>
-                        <a:t>most</a:t>
-                      </a:r>
-                      <a:r>
-                        <a:rPr sz="1050" spc="70" dirty="0">
-                          <a:solidFill>
-                            <a:srgbClr val="4471C4"/>
-                          </a:solidFill>
-                          <a:latin typeface="Times New Roman"/>
-                          <a:cs typeface="Times New Roman"/>
-                        </a:rPr>
-                        <a:t> </a:t>
-                      </a:r>
-                      <a:r>
-                        <a:rPr sz="1050" spc="-10" dirty="0">
-                          <a:solidFill>
-                            <a:srgbClr val="4471C4"/>
-                          </a:solidFill>
-                          <a:latin typeface="Times New Roman"/>
-                          <a:cs typeface="Times New Roman"/>
-                        </a:rPr>
-                        <a:t>but</a:t>
-                      </a:r>
-                      <a:r>
-                        <a:rPr sz="1050" spc="-5" dirty="0">
-                          <a:solidFill>
-                            <a:srgbClr val="4471C4"/>
-                          </a:solidFill>
-                          <a:latin typeface="Times New Roman"/>
-                          <a:cs typeface="Times New Roman"/>
-                        </a:rPr>
-                        <a:t> </a:t>
-                      </a:r>
-                      <a:r>
-                        <a:rPr sz="1050" spc="-20" dirty="0">
-                          <a:solidFill>
-                            <a:srgbClr val="4471C4"/>
-                          </a:solidFill>
-                          <a:latin typeface="Times New Roman"/>
-                          <a:cs typeface="Times New Roman"/>
-                        </a:rPr>
-                        <a:t>most</a:t>
-                      </a:r>
-                      <a:r>
-                        <a:rPr sz="1050" spc="50" dirty="0">
-                          <a:solidFill>
-                            <a:srgbClr val="4471C4"/>
-                          </a:solidFill>
-                          <a:latin typeface="Times New Roman"/>
-                          <a:cs typeface="Times New Roman"/>
-                        </a:rPr>
-                        <a:t> </a:t>
-                      </a:r>
-                      <a:r>
-                        <a:rPr sz="1050" spc="-15" dirty="0">
-                          <a:solidFill>
-                            <a:srgbClr val="4471C4"/>
-                          </a:solidFill>
-                          <a:latin typeface="Times New Roman"/>
-                          <a:cs typeface="Times New Roman"/>
-                        </a:rPr>
-                        <a:t>difficult</a:t>
-                      </a:r>
-                      <a:r>
-                        <a:rPr sz="1050" spc="65" dirty="0">
-                          <a:solidFill>
-                            <a:srgbClr val="4471C4"/>
-                          </a:solidFill>
-                          <a:latin typeface="Times New Roman"/>
-                          <a:cs typeface="Times New Roman"/>
-                        </a:rPr>
-                        <a:t> </a:t>
-                      </a:r>
-                      <a:r>
-                        <a:rPr sz="1050" spc="-5" dirty="0">
-                          <a:solidFill>
-                            <a:srgbClr val="4471C4"/>
-                          </a:solidFill>
-                          <a:latin typeface="Times New Roman"/>
-                          <a:cs typeface="Times New Roman"/>
-                        </a:rPr>
-                        <a:t>to</a:t>
-                      </a:r>
-                      <a:r>
-                        <a:rPr sz="1050" spc="-20" dirty="0">
-                          <a:solidFill>
-                            <a:srgbClr val="4471C4"/>
-                          </a:solidFill>
-                          <a:latin typeface="Times New Roman"/>
-                          <a:cs typeface="Times New Roman"/>
-                        </a:rPr>
-                        <a:t> </a:t>
-                      </a:r>
-                      <a:r>
-                        <a:rPr sz="1050" spc="-5" dirty="0">
-                          <a:solidFill>
-                            <a:srgbClr val="4471C4"/>
-                          </a:solidFill>
-                          <a:latin typeface="Times New Roman"/>
-                          <a:cs typeface="Times New Roman"/>
-                        </a:rPr>
-                        <a:t>reach</a:t>
-                      </a:r>
-                      <a:endParaRPr sz="1050">
-                        <a:latin typeface="Times New Roman"/>
+                        <a:rPr lang="ko-KR" altLang="en-US" sz="1050" spc="-10" dirty="0" smtClean="0">
+                          <a:solidFill>
+                            <a:srgbClr val="4471C4"/>
+                          </a:solidFill>
+                          <a:latin typeface="+mj-lt"/>
+                          <a:cs typeface="Times New Roman"/>
+                        </a:rPr>
+                        <a:t>이미지 데이터를 저장</a:t>
+                      </a:r>
+                      <a:r>
+                        <a:rPr lang="en-US" altLang="ko-KR" sz="1050" spc="-10" dirty="0" smtClean="0">
+                          <a:solidFill>
+                            <a:srgbClr val="4471C4"/>
+                          </a:solidFill>
+                          <a:latin typeface="+mj-lt"/>
+                          <a:cs typeface="Times New Roman"/>
+                        </a:rPr>
+                        <a:t>, </a:t>
+                      </a:r>
+                      <a:r>
+                        <a:rPr lang="ko-KR" altLang="en-US" sz="1050" spc="-10" dirty="0" smtClean="0">
+                          <a:solidFill>
+                            <a:srgbClr val="4471C4"/>
+                          </a:solidFill>
+                          <a:latin typeface="+mj-lt"/>
+                          <a:cs typeface="Times New Roman"/>
+                        </a:rPr>
+                        <a:t>관리할 </a:t>
+                      </a:r>
+                      <a:r>
+                        <a:rPr lang="en-US" altLang="ko-KR" sz="1050" spc="-10" dirty="0" smtClean="0">
+                          <a:solidFill>
+                            <a:srgbClr val="4471C4"/>
+                          </a:solidFill>
+                          <a:latin typeface="+mj-lt"/>
+                          <a:cs typeface="Times New Roman"/>
+                        </a:rPr>
+                        <a:t>APP</a:t>
+                      </a:r>
+                      <a:r>
+                        <a:rPr lang="ko-KR" altLang="en-US" sz="1050" spc="-10" dirty="0" smtClean="0">
+                          <a:solidFill>
+                            <a:srgbClr val="4471C4"/>
+                          </a:solidFill>
+                          <a:latin typeface="+mj-lt"/>
+                          <a:cs typeface="Times New Roman"/>
+                        </a:rPr>
+                        <a:t>과 서버의 개발</a:t>
+                      </a:r>
+                      <a:endParaRPr sz="1050" dirty="0">
+                        <a:latin typeface="+mj-lt"/>
                         <a:cs typeface="Times New Roman"/>
                       </a:endParaRPr>
                     </a:p>
@@ -21516,7 +21235,7 @@
                         </a:spcBef>
                       </a:pPr>
                       <a:endParaRPr sz="1300">
-                        <a:latin typeface="Times New Roman"/>
+                        <a:latin typeface="+mj-lt"/>
                         <a:cs typeface="Times New Roman"/>
                       </a:endParaRPr>
                     </a:p>
@@ -21528,13 +21247,13 @@
                       </a:pPr>
                       <a:r>
                         <a:rPr sz="1050" b="1" spc="-5" dirty="0">
-                          <a:latin typeface="Times New Roman"/>
+                          <a:latin typeface="+mj-lt"/>
                           <a:cs typeface="Times New Roman"/>
                         </a:rPr>
                         <a:t>Content</a:t>
                       </a:r>
                       <a:endParaRPr sz="1050">
-                        <a:latin typeface="Times New Roman"/>
+                        <a:latin typeface="+mj-lt"/>
                         <a:cs typeface="Times New Roman"/>
                       </a:endParaRPr>
                     </a:p>
@@ -21565,192 +21284,162 @@
                     <a:bodyPr/>
                     <a:lstStyle/>
                     <a:p>
-                      <a:pPr>
+                      <a:pPr marL="86995" algn="l">
                         <a:lnSpc>
                           <a:spcPct val="100000"/>
                         </a:lnSpc>
-                        <a:spcBef>
-                          <a:spcPts val="15"/>
-                        </a:spcBef>
                       </a:pPr>
-                      <a:endParaRPr sz="1300">
-                        <a:latin typeface="Times New Roman"/>
+                      <a:r>
+                        <a:rPr lang="en-US" altLang="ko-KR" sz="1050" dirty="0" smtClean="0">
+                          <a:solidFill>
+                            <a:srgbClr val="4471C4"/>
+                          </a:solidFill>
+                          <a:latin typeface="+mj-lt"/>
+                          <a:cs typeface="Times New Roman"/>
+                        </a:rPr>
+                        <a:t>AI </a:t>
+                      </a:r>
+                      <a:r>
+                        <a:rPr lang="ko-KR" altLang="en-US" sz="1050" dirty="0" smtClean="0">
+                          <a:solidFill>
+                            <a:srgbClr val="4471C4"/>
+                          </a:solidFill>
+                          <a:latin typeface="+mj-lt"/>
+                          <a:cs typeface="Times New Roman"/>
+                        </a:rPr>
+                        <a:t>모델 개발</a:t>
+                      </a:r>
+                      <a:r>
+                        <a:rPr lang="en-US" altLang="ko-KR" sz="1050" dirty="0" smtClean="0">
+                          <a:solidFill>
+                            <a:srgbClr val="4471C4"/>
+                          </a:solidFill>
+                          <a:latin typeface="+mj-lt"/>
+                          <a:cs typeface="Times New Roman"/>
+                        </a:rPr>
+                        <a:t>, User Interface</a:t>
+                      </a:r>
+                      <a:r>
+                        <a:rPr lang="en-US" altLang="ko-KR" sz="1050" baseline="0" dirty="0" smtClean="0">
+                          <a:solidFill>
+                            <a:srgbClr val="4471C4"/>
+                          </a:solidFill>
+                          <a:latin typeface="+mj-lt"/>
+                          <a:cs typeface="Times New Roman"/>
+                        </a:rPr>
+                        <a:t> </a:t>
+                      </a:r>
+                      <a:r>
+                        <a:rPr lang="ko-KR" altLang="en-US" sz="1050" baseline="0" dirty="0" smtClean="0">
+                          <a:solidFill>
+                            <a:srgbClr val="4471C4"/>
+                          </a:solidFill>
+                          <a:latin typeface="+mj-lt"/>
+                          <a:cs typeface="Times New Roman"/>
+                        </a:rPr>
+                        <a:t>개발</a:t>
+                      </a:r>
+                      <a:endParaRPr lang="en-US" altLang="ko-KR" sz="1050" baseline="0" dirty="0" smtClean="0">
+                        <a:solidFill>
+                          <a:srgbClr val="4471C4"/>
+                        </a:solidFill>
+                        <a:latin typeface="+mj-lt"/>
                         <a:cs typeface="Times New Roman"/>
                       </a:endParaRPr>
                     </a:p>
                     <a:p>
-                      <a:pPr marL="86995">
+                      <a:pPr marL="86995" algn="l">
                         <a:lnSpc>
                           <a:spcPct val="100000"/>
                         </a:lnSpc>
                       </a:pPr>
                       <a:r>
-                        <a:rPr sz="1050" dirty="0">
-                          <a:solidFill>
-                            <a:srgbClr val="4471C4"/>
-                          </a:solidFill>
-                          <a:latin typeface="Times New Roman"/>
-                          <a:cs typeface="Times New Roman"/>
-                        </a:rPr>
-                        <a:t>A</a:t>
-                      </a:r>
-                      <a:r>
-                        <a:rPr sz="1050" spc="-65" dirty="0">
-                          <a:solidFill>
-                            <a:srgbClr val="4471C4"/>
-                          </a:solidFill>
-                          <a:latin typeface="Times New Roman"/>
-                          <a:cs typeface="Times New Roman"/>
-                        </a:rPr>
-                        <a:t> </a:t>
-                      </a:r>
-                      <a:r>
-                        <a:rPr sz="1050" spc="-10" dirty="0">
-                          <a:solidFill>
-                            <a:srgbClr val="4471C4"/>
-                          </a:solidFill>
-                          <a:latin typeface="Times New Roman"/>
-                          <a:cs typeface="Times New Roman"/>
-                        </a:rPr>
-                        <a:t>service</a:t>
-                      </a:r>
-                      <a:r>
-                        <a:rPr sz="1050" spc="-5" dirty="0">
-                          <a:solidFill>
-                            <a:srgbClr val="4471C4"/>
-                          </a:solidFill>
-                          <a:latin typeface="Times New Roman"/>
-                          <a:cs typeface="Times New Roman"/>
-                        </a:rPr>
-                        <a:t> that</a:t>
-                      </a:r>
-                      <a:r>
-                        <a:rPr sz="1050" spc="-30" dirty="0">
-                          <a:solidFill>
-                            <a:srgbClr val="4471C4"/>
-                          </a:solidFill>
-                          <a:latin typeface="Times New Roman"/>
-                          <a:cs typeface="Times New Roman"/>
-                        </a:rPr>
-                        <a:t> </a:t>
-                      </a:r>
-                      <a:r>
-                        <a:rPr sz="1050" spc="-15" dirty="0">
-                          <a:solidFill>
-                            <a:srgbClr val="4471C4"/>
-                          </a:solidFill>
-                          <a:latin typeface="Times New Roman"/>
-                          <a:cs typeface="Times New Roman"/>
-                        </a:rPr>
-                        <a:t>detects</a:t>
-                      </a:r>
-                      <a:r>
-                        <a:rPr sz="1050" dirty="0">
-                          <a:solidFill>
-                            <a:srgbClr val="4471C4"/>
-                          </a:solidFill>
-                          <a:latin typeface="Times New Roman"/>
-                          <a:cs typeface="Times New Roman"/>
-                        </a:rPr>
-                        <a:t> </a:t>
-                      </a:r>
-                      <a:r>
-                        <a:rPr sz="1050" spc="-15" dirty="0">
-                          <a:solidFill>
-                            <a:srgbClr val="4471C4"/>
-                          </a:solidFill>
-                          <a:latin typeface="Times New Roman"/>
-                          <a:cs typeface="Times New Roman"/>
-                        </a:rPr>
-                        <a:t>defective</a:t>
-                      </a:r>
-                      <a:r>
-                        <a:rPr sz="1050" spc="65" dirty="0">
-                          <a:solidFill>
-                            <a:srgbClr val="4471C4"/>
-                          </a:solidFill>
-                          <a:latin typeface="Times New Roman"/>
-                          <a:cs typeface="Times New Roman"/>
-                        </a:rPr>
-                        <a:t> </a:t>
-                      </a:r>
-                      <a:r>
-                        <a:rPr sz="1050" spc="-5" dirty="0">
-                          <a:solidFill>
-                            <a:srgbClr val="4471C4"/>
-                          </a:solidFill>
-                          <a:latin typeface="Times New Roman"/>
-                          <a:cs typeface="Times New Roman"/>
-                        </a:rPr>
-                        <a:t>parts</a:t>
-                      </a:r>
-                      <a:r>
-                        <a:rPr sz="1050" spc="-45" dirty="0">
-                          <a:solidFill>
-                            <a:srgbClr val="4471C4"/>
-                          </a:solidFill>
-                          <a:latin typeface="Times New Roman"/>
-                          <a:cs typeface="Times New Roman"/>
-                        </a:rPr>
-                        <a:t> </a:t>
-                      </a:r>
-                      <a:r>
-                        <a:rPr sz="1050" spc="-5" dirty="0">
-                          <a:solidFill>
-                            <a:srgbClr val="4471C4"/>
-                          </a:solidFill>
-                          <a:latin typeface="Times New Roman"/>
-                          <a:cs typeface="Times New Roman"/>
-                        </a:rPr>
-                        <a:t>in</a:t>
-                      </a:r>
-                      <a:r>
-                        <a:rPr sz="1050" spc="-25" dirty="0">
-                          <a:solidFill>
-                            <a:srgbClr val="4471C4"/>
-                          </a:solidFill>
-                          <a:latin typeface="Times New Roman"/>
-                          <a:cs typeface="Times New Roman"/>
-                        </a:rPr>
-                        <a:t> </a:t>
-                      </a:r>
-                      <a:r>
-                        <a:rPr sz="1050" spc="-5" dirty="0">
-                          <a:solidFill>
-                            <a:srgbClr val="4471C4"/>
-                          </a:solidFill>
-                          <a:latin typeface="Times New Roman"/>
-                          <a:cs typeface="Times New Roman"/>
-                        </a:rPr>
-                        <a:t>steel</a:t>
-                      </a:r>
-                      <a:r>
-                        <a:rPr sz="1050" spc="-10" dirty="0">
-                          <a:solidFill>
-                            <a:srgbClr val="4471C4"/>
-                          </a:solidFill>
-                          <a:latin typeface="Times New Roman"/>
-                          <a:cs typeface="Times New Roman"/>
-                        </a:rPr>
-                        <a:t> </a:t>
-                      </a:r>
-                      <a:r>
-                        <a:rPr sz="1050" spc="-15" dirty="0">
-                          <a:solidFill>
-                            <a:srgbClr val="4471C4"/>
-                          </a:solidFill>
-                          <a:latin typeface="Times New Roman"/>
-                          <a:cs typeface="Times New Roman"/>
-                        </a:rPr>
-                        <a:t>images.</a:t>
-                      </a:r>
-                      <a:endParaRPr sz="1050">
-                        <a:latin typeface="Times New Roman"/>
+                        <a:rPr lang="en-US" altLang="ko-KR" sz="1050" baseline="0" dirty="0" smtClean="0">
+                          <a:solidFill>
+                            <a:srgbClr val="4471C4"/>
+                          </a:solidFill>
+                          <a:latin typeface="+mj-lt"/>
+                          <a:cs typeface="Times New Roman"/>
+                        </a:rPr>
+                        <a:t>JPA </a:t>
+                      </a:r>
+                      <a:r>
+                        <a:rPr lang="ko-KR" altLang="en-US" sz="1050" baseline="0" dirty="0" smtClean="0">
+                          <a:solidFill>
+                            <a:srgbClr val="4471C4"/>
+                          </a:solidFill>
+                          <a:latin typeface="+mj-lt"/>
+                          <a:cs typeface="Times New Roman"/>
+                        </a:rPr>
+                        <a:t>개발</a:t>
+                      </a:r>
+                      <a:r>
+                        <a:rPr lang="en-US" altLang="ko-KR" sz="1050" baseline="0" dirty="0" smtClean="0">
+                          <a:solidFill>
+                            <a:srgbClr val="4471C4"/>
+                          </a:solidFill>
+                          <a:latin typeface="+mj-lt"/>
+                          <a:cs typeface="Times New Roman"/>
+                        </a:rPr>
+                        <a:t>, </a:t>
+                      </a:r>
+                      <a:r>
+                        <a:rPr lang="ko-KR" altLang="en-US" sz="1050" baseline="0" dirty="0" smtClean="0">
+                          <a:solidFill>
+                            <a:srgbClr val="4471C4"/>
+                          </a:solidFill>
+                          <a:latin typeface="+mj-lt"/>
+                          <a:cs typeface="Times New Roman"/>
+                        </a:rPr>
+                        <a:t>서버 구축</a:t>
+                      </a:r>
+                      <a:r>
+                        <a:rPr lang="en-US" altLang="ko-KR" sz="1050" baseline="0" dirty="0" smtClean="0">
+                          <a:solidFill>
+                            <a:srgbClr val="4471C4"/>
+                          </a:solidFill>
+                          <a:latin typeface="+mj-lt"/>
+                          <a:cs typeface="Times New Roman"/>
+                        </a:rPr>
+                        <a:t>, AWS</a:t>
+                      </a:r>
+                      <a:r>
+                        <a:rPr lang="ko-KR" altLang="en-US" sz="1050" baseline="0" dirty="0" smtClean="0">
+                          <a:solidFill>
+                            <a:srgbClr val="4471C4"/>
+                          </a:solidFill>
+                          <a:latin typeface="+mj-lt"/>
+                          <a:cs typeface="Times New Roman"/>
+                        </a:rPr>
+                        <a:t>의 </a:t>
+                      </a:r>
+                      <a:r>
+                        <a:rPr lang="en-US" altLang="ko-KR" sz="1050" baseline="0" dirty="0" smtClean="0">
+                          <a:solidFill>
+                            <a:srgbClr val="4471C4"/>
+                          </a:solidFill>
+                          <a:latin typeface="+mj-lt"/>
+                          <a:cs typeface="Times New Roman"/>
+                        </a:rPr>
+                        <a:t>RDS</a:t>
+                      </a:r>
+                      <a:r>
+                        <a:rPr lang="ko-KR" altLang="en-US" sz="1050" baseline="0" dirty="0" smtClean="0">
+                          <a:solidFill>
+                            <a:srgbClr val="4471C4"/>
+                          </a:solidFill>
+                          <a:latin typeface="+mj-lt"/>
+                          <a:cs typeface="Times New Roman"/>
+                        </a:rPr>
+                        <a:t>로 전송 및 저장</a:t>
+                      </a:r>
+                      <a:endParaRPr sz="1050" dirty="0">
+                        <a:latin typeface="+mj-lt"/>
                         <a:cs typeface="Times New Roman"/>
                       </a:endParaRPr>
                     </a:p>
                   </a:txBody>
-                  <a:tcPr marL="0" marR="0" marT="1905" marB="0">
+                  <a:tcPr marL="0" marR="0" marT="1905" marB="0" anchor="ctr">
                     <a:lnL w="9525">
                       <a:solidFill>
                         <a:srgbClr val="7E7E7E"/>
@@ -21789,7 +21478,7 @@
                         </a:lnSpc>
                       </a:pPr>
                       <a:endParaRPr sz="1100">
-                        <a:latin typeface="Times New Roman"/>
+                        <a:latin typeface="+mj-lt"/>
                         <a:cs typeface="Times New Roman"/>
                       </a:endParaRPr>
                     </a:p>
@@ -21800,7 +21489,7 @@
                         </a:lnSpc>
                       </a:pPr>
                       <a:endParaRPr sz="1100">
-                        <a:latin typeface="Times New Roman"/>
+                        <a:latin typeface="+mj-lt"/>
                         <a:cs typeface="Times New Roman"/>
                       </a:endParaRPr>
                     </a:p>
@@ -21814,7 +21503,7 @@
                         </a:spcBef>
                       </a:pPr>
                       <a:endParaRPr sz="1500">
-                        <a:latin typeface="Times New Roman"/>
+                        <a:latin typeface="+mj-lt"/>
                         <a:cs typeface="Times New Roman"/>
                       </a:endParaRPr>
                     </a:p>
@@ -21826,83 +21515,83 @@
                       </a:pPr>
                       <a:r>
                         <a:rPr sz="1050" b="1" dirty="0">
-                          <a:latin typeface="Times New Roman"/>
+                          <a:latin typeface="+mj-lt"/>
                           <a:cs typeface="Times New Roman"/>
                         </a:rPr>
                         <a:t>D</a:t>
                       </a:r>
                       <a:r>
                         <a:rPr sz="1050" b="1" spc="5" dirty="0">
-                          <a:latin typeface="Times New Roman"/>
+                          <a:latin typeface="+mj-lt"/>
                           <a:cs typeface="Times New Roman"/>
                         </a:rPr>
                         <a:t>et</a:t>
                       </a:r>
                       <a:r>
                         <a:rPr sz="1050" b="1" dirty="0">
-                          <a:latin typeface="Times New Roman"/>
+                          <a:latin typeface="+mj-lt"/>
                           <a:cs typeface="Times New Roman"/>
                         </a:rPr>
                         <a:t>a</a:t>
                       </a:r>
                       <a:r>
                         <a:rPr sz="1050" b="1" spc="-10" dirty="0">
-                          <a:latin typeface="Times New Roman"/>
+                          <a:latin typeface="+mj-lt"/>
                           <a:cs typeface="Times New Roman"/>
                         </a:rPr>
                         <a:t>i</a:t>
                       </a:r>
                       <a:r>
                         <a:rPr sz="1050" b="1" dirty="0">
-                          <a:latin typeface="Times New Roman"/>
+                          <a:latin typeface="+mj-lt"/>
                           <a:cs typeface="Times New Roman"/>
                         </a:rPr>
                         <a:t>l</a:t>
                       </a:r>
                       <a:r>
                         <a:rPr sz="1050" b="1" spc="-75" dirty="0">
-                          <a:latin typeface="Times New Roman"/>
+                          <a:latin typeface="+mj-lt"/>
                           <a:cs typeface="Times New Roman"/>
                         </a:rPr>
                         <a:t> </a:t>
                       </a:r>
                       <a:r>
                         <a:rPr sz="1050" b="1" spc="5" dirty="0">
-                          <a:latin typeface="Times New Roman"/>
+                          <a:latin typeface="+mj-lt"/>
                           <a:cs typeface="Times New Roman"/>
                         </a:rPr>
                         <a:t>r</a:t>
                       </a:r>
                       <a:r>
                         <a:rPr sz="1050" b="1" dirty="0">
-                          <a:latin typeface="Times New Roman"/>
+                          <a:latin typeface="+mj-lt"/>
                           <a:cs typeface="Times New Roman"/>
                         </a:rPr>
                         <a:t>o</a:t>
                       </a:r>
                       <a:r>
                         <a:rPr sz="1050" b="1" spc="-10" dirty="0">
-                          <a:latin typeface="Times New Roman"/>
+                          <a:latin typeface="+mj-lt"/>
                           <a:cs typeface="Times New Roman"/>
                         </a:rPr>
                         <a:t>l</a:t>
                       </a:r>
                       <a:r>
                         <a:rPr sz="1050" b="1" spc="5" dirty="0">
-                          <a:latin typeface="Times New Roman"/>
+                          <a:latin typeface="+mj-lt"/>
                           <a:cs typeface="Times New Roman"/>
                         </a:rPr>
                         <a:t>e</a:t>
                       </a:r>
                       <a:r>
                         <a:rPr sz="1050" b="1" dirty="0">
-                          <a:latin typeface="Times New Roman"/>
+                          <a:latin typeface="+mj-lt"/>
                           <a:cs typeface="Times New Roman"/>
                         </a:rPr>
                         <a:t>s</a:t>
                       </a:r>
                       <a:endParaRPr sz="1050">
-                        <a:latin typeface="Times New Roman"/>
+                        <a:latin typeface="+mj-lt"/>
                         <a:cs typeface="Times New Roman"/>
                       </a:endParaRPr>
                     </a:p>
@@ -21947,77 +21636,67 @@
                         </a:tabLst>
                       </a:pPr>
                       <a:r>
-                        <a:rPr sz="1050" spc="-15" dirty="0">
-                          <a:solidFill>
-                            <a:srgbClr val="4471C4"/>
-                          </a:solidFill>
-                          <a:latin typeface="Times New Roman"/>
-                          <a:cs typeface="Times New Roman"/>
-                        </a:rPr>
-                        <a:t>UI/UX planning </a:t>
-                      </a:r>
-                      <a:r>
-                        <a:rPr sz="1050" spc="-5" dirty="0">
-                          <a:solidFill>
-                            <a:srgbClr val="4471C4"/>
-                          </a:solidFill>
-                          <a:latin typeface="Times New Roman"/>
-                          <a:cs typeface="Times New Roman"/>
-                        </a:rPr>
-                        <a:t>and </a:t>
-                      </a:r>
-                      <a:r>
-                        <a:rPr sz="1050" spc="-15" dirty="0">
-                          <a:solidFill>
-                            <a:srgbClr val="4471C4"/>
-                          </a:solidFill>
-                          <a:latin typeface="Times New Roman"/>
-                          <a:cs typeface="Times New Roman"/>
-                        </a:rPr>
-                        <a:t>development</a:t>
-                      </a:r>
-                      <a:r>
-                        <a:rPr sz="1050" spc="-10" dirty="0">
-                          <a:solidFill>
-                            <a:srgbClr val="4471C4"/>
-                          </a:solidFill>
-                          <a:latin typeface="Times New Roman"/>
-                          <a:cs typeface="Times New Roman"/>
-                        </a:rPr>
-                        <a:t> using Flutter </a:t>
-                      </a:r>
-                      <a:r>
-                        <a:rPr sz="1050" spc="-20" dirty="0">
-                          <a:solidFill>
-                            <a:srgbClr val="4471C4"/>
-                          </a:solidFill>
-                          <a:latin typeface="Times New Roman"/>
-                          <a:cs typeface="Times New Roman"/>
-                        </a:rPr>
-                        <a:t>and </a:t>
-                      </a:r>
-                      <a:r>
-                        <a:rPr sz="1050" spc="-250" dirty="0">
-                          <a:solidFill>
-                            <a:srgbClr val="4471C4"/>
-                          </a:solidFill>
-                          <a:latin typeface="Times New Roman"/>
-                          <a:cs typeface="Times New Roman"/>
-                        </a:rPr>
-                        <a:t> </a:t>
-                      </a:r>
-                      <a:r>
-                        <a:rPr sz="1050" spc="-20" dirty="0">
-                          <a:solidFill>
-                            <a:srgbClr val="4471C4"/>
-                          </a:solidFill>
-                          <a:latin typeface="Times New Roman"/>
+                        <a:rPr lang="en-US" sz="1050" spc="-15" dirty="0" smtClean="0">
+                          <a:solidFill>
+                            <a:srgbClr val="4471C4"/>
+                          </a:solidFill>
+                          <a:latin typeface="+mj-lt"/>
+                          <a:cs typeface="Times New Roman"/>
+                        </a:rPr>
+                        <a:t>Flutter</a:t>
+                      </a:r>
+                      <a:r>
+                        <a:rPr lang="ko-KR" altLang="en-US" sz="1050" spc="-15" dirty="0" smtClean="0">
+                          <a:solidFill>
+                            <a:srgbClr val="4471C4"/>
+                          </a:solidFill>
+                          <a:latin typeface="+mj-lt"/>
+                          <a:cs typeface="Times New Roman"/>
+                        </a:rPr>
+                        <a:t>와 </a:t>
+                      </a:r>
+                      <a:r>
+                        <a:rPr lang="en-US" altLang="ko-KR" sz="1050" spc="-15" dirty="0" err="1" smtClean="0">
+                          <a:solidFill>
+                            <a:srgbClr val="4471C4"/>
+                          </a:solidFill>
+                          <a:latin typeface="+mj-lt"/>
                           <a:cs typeface="Times New Roman"/>
                         </a:rPr>
                         <a:t>Figma</a:t>
                       </a:r>
-                      <a:endParaRPr sz="1050">
-                        <a:latin typeface="Times New Roman"/>
+                      <a:r>
+                        <a:rPr lang="ko-KR" altLang="en-US" sz="1050" spc="-15" dirty="0" smtClean="0">
+                          <a:solidFill>
+                            <a:srgbClr val="4471C4"/>
+                          </a:solidFill>
+                          <a:latin typeface="+mj-lt"/>
+                          <a:cs typeface="Times New Roman"/>
+                        </a:rPr>
+                        <a:t>를 이용한 </a:t>
+                      </a:r>
+                      <a:r>
+                        <a:rPr lang="en-US" altLang="ko-KR" sz="1050" spc="-15" dirty="0" smtClean="0">
+                          <a:solidFill>
+                            <a:srgbClr val="4471C4"/>
+                          </a:solidFill>
+                          <a:latin typeface="+mj-lt"/>
+                          <a:cs typeface="Times New Roman"/>
+                        </a:rPr>
+                        <a:t>UI/UX </a:t>
+                      </a:r>
+                      <a:r>
+                        <a:rPr lang="ko-KR" altLang="en-US" sz="1050" spc="-15" dirty="0" smtClean="0">
+                          <a:solidFill>
+                            <a:srgbClr val="4471C4"/>
+                          </a:solidFill>
+                          <a:latin typeface="+mj-lt"/>
+                          <a:cs typeface="Times New Roman"/>
+                        </a:rPr>
+                        <a:t>계획 및 개발</a:t>
+                      </a:r>
+                      <a:endParaRPr sz="1050" dirty="0">
+                        <a:latin typeface="+mj-lt"/>
                         <a:cs typeface="Times New Roman"/>
                       </a:endParaRPr>
                     </a:p>
@@ -22033,191 +21712,87 @@
                         </a:tabLst>
                       </a:pPr>
                       <a:r>
-                        <a:rPr sz="1050" dirty="0">
-                          <a:solidFill>
-                            <a:srgbClr val="4471C4"/>
-                          </a:solidFill>
-                          <a:latin typeface="Times New Roman"/>
+                        <a:rPr lang="en-US" sz="1050" dirty="0" smtClean="0">
+                          <a:solidFill>
+                            <a:srgbClr val="4471C4"/>
+                          </a:solidFill>
+                          <a:latin typeface="+mj-lt"/>
                           <a:cs typeface="Times New Roman"/>
                         </a:rPr>
                         <a:t>BE</a:t>
                       </a:r>
                       <a:r>
-                        <a:rPr sz="1050" spc="-20" dirty="0">
-                          <a:solidFill>
-                            <a:srgbClr val="4471C4"/>
-                          </a:solidFill>
-                          <a:latin typeface="Times New Roman"/>
-                          <a:cs typeface="Times New Roman"/>
-                        </a:rPr>
-                        <a:t> development</a:t>
-                      </a:r>
-                      <a:r>
-                        <a:rPr sz="1050" spc="95" dirty="0">
-                          <a:solidFill>
-                            <a:srgbClr val="4471C4"/>
-                          </a:solidFill>
-                          <a:latin typeface="Times New Roman"/>
-                          <a:cs typeface="Times New Roman"/>
-                        </a:rPr>
-                        <a:t> </a:t>
-                      </a:r>
-                      <a:r>
-                        <a:rPr sz="1050" spc="-5" dirty="0">
-                          <a:solidFill>
-                            <a:srgbClr val="4471C4"/>
-                          </a:solidFill>
-                          <a:latin typeface="Times New Roman"/>
-                          <a:cs typeface="Times New Roman"/>
-                        </a:rPr>
-                        <a:t>and</a:t>
-                      </a:r>
-                      <a:r>
-                        <a:rPr sz="1050" spc="-15" dirty="0">
-                          <a:solidFill>
-                            <a:srgbClr val="4471C4"/>
-                          </a:solidFill>
-                          <a:latin typeface="Times New Roman"/>
-                          <a:cs typeface="Times New Roman"/>
-                        </a:rPr>
-                        <a:t> </a:t>
-                      </a:r>
-                      <a:r>
-                        <a:rPr sz="1050" spc="5" dirty="0">
-                          <a:solidFill>
-                            <a:srgbClr val="4471C4"/>
-                          </a:solidFill>
-                          <a:latin typeface="Times New Roman"/>
+                        <a:rPr lang="ko-KR" altLang="en-US" sz="1050" dirty="0" smtClean="0">
+                          <a:solidFill>
+                            <a:srgbClr val="4471C4"/>
+                          </a:solidFill>
+                          <a:latin typeface="+mj-lt"/>
+                          <a:cs typeface="Times New Roman"/>
+                        </a:rPr>
+                        <a:t>개발과 </a:t>
+                      </a:r>
+                      <a:r>
+                        <a:rPr lang="en-US" altLang="ko-KR" sz="1050" dirty="0" smtClean="0">
+                          <a:solidFill>
+                            <a:srgbClr val="4471C4"/>
+                          </a:solidFill>
+                          <a:latin typeface="+mj-lt"/>
+                          <a:cs typeface="Times New Roman"/>
+                        </a:rPr>
+                        <a:t>AWS</a:t>
+                      </a:r>
+                      <a:r>
+                        <a:rPr lang="ko-KR" altLang="en-US" sz="1050" dirty="0" smtClean="0">
+                          <a:solidFill>
+                            <a:srgbClr val="4471C4"/>
+                          </a:solidFill>
+                          <a:latin typeface="+mj-lt"/>
+                          <a:cs typeface="Times New Roman"/>
+                        </a:rPr>
+                        <a:t>와 </a:t>
+                      </a:r>
+                      <a:r>
+                        <a:rPr lang="en-US" altLang="ko-KR" sz="1050" dirty="0" smtClean="0">
+                          <a:solidFill>
+                            <a:srgbClr val="4471C4"/>
+                          </a:solidFill>
+                          <a:latin typeface="+mj-lt"/>
+                          <a:cs typeface="Times New Roman"/>
+                        </a:rPr>
+                        <a:t>JPA</a:t>
+                      </a:r>
+                      <a:r>
+                        <a:rPr lang="ko-KR" altLang="en-US" sz="1050" dirty="0" smtClean="0">
+                          <a:solidFill>
+                            <a:srgbClr val="4471C4"/>
+                          </a:solidFill>
+                          <a:latin typeface="+mj-lt"/>
+                          <a:cs typeface="Times New Roman"/>
+                        </a:rPr>
+                        <a:t>를 이용한 </a:t>
+                      </a:r>
+                      <a:r>
+                        <a:rPr lang="en-US" altLang="ko-KR" sz="1050" dirty="0" smtClean="0">
+                          <a:solidFill>
+                            <a:srgbClr val="4471C4"/>
+                          </a:solidFill>
+                          <a:latin typeface="+mj-lt"/>
                           <a:cs typeface="Times New Roman"/>
                         </a:rPr>
                         <a:t>DB</a:t>
                       </a:r>
                       <a:r>
-                        <a:rPr sz="1050" spc="-5" dirty="0">
-                          <a:solidFill>
-                            <a:srgbClr val="4471C4"/>
-                          </a:solidFill>
-                          <a:latin typeface="Times New Roman"/>
-                          <a:cs typeface="Times New Roman"/>
-                        </a:rPr>
-                        <a:t> </a:t>
-                      </a:r>
-                      <a:r>
-                        <a:rPr sz="1050" spc="-10" dirty="0">
-                          <a:solidFill>
-                            <a:srgbClr val="4471C4"/>
-                          </a:solidFill>
-                          <a:latin typeface="Times New Roman"/>
-                          <a:cs typeface="Times New Roman"/>
-                        </a:rPr>
-                        <a:t>server</a:t>
-                      </a:r>
-                      <a:r>
-                        <a:rPr sz="1050" spc="15" dirty="0">
-                          <a:solidFill>
-                            <a:srgbClr val="4471C4"/>
-                          </a:solidFill>
-                          <a:latin typeface="Times New Roman"/>
-                          <a:cs typeface="Times New Roman"/>
-                        </a:rPr>
-                        <a:t> </a:t>
-                      </a:r>
-                      <a:r>
-                        <a:rPr sz="1050" spc="-15" dirty="0">
-                          <a:solidFill>
-                            <a:srgbClr val="4471C4"/>
-                          </a:solidFill>
-                          <a:latin typeface="Times New Roman"/>
-                          <a:cs typeface="Times New Roman"/>
-                        </a:rPr>
-                        <a:t>construction</a:t>
-                      </a:r>
-                      <a:r>
-                        <a:rPr sz="1050" spc="80" dirty="0">
-                          <a:solidFill>
-                            <a:srgbClr val="4471C4"/>
-                          </a:solidFill>
-                          <a:latin typeface="Times New Roman"/>
-                          <a:cs typeface="Times New Roman"/>
-                        </a:rPr>
-                        <a:t> </a:t>
-                      </a:r>
-                      <a:r>
-                        <a:rPr sz="1050" spc="-15" dirty="0">
-                          <a:solidFill>
-                            <a:srgbClr val="4471C4"/>
-                          </a:solidFill>
-                          <a:latin typeface="Times New Roman"/>
-                          <a:cs typeface="Times New Roman"/>
-                        </a:rPr>
-                        <a:t>using</a:t>
-                      </a:r>
-                      <a:r>
-                        <a:rPr sz="1050" spc="-20" dirty="0">
-                          <a:solidFill>
-                            <a:srgbClr val="4471C4"/>
-                          </a:solidFill>
-                          <a:latin typeface="Times New Roman"/>
-                          <a:cs typeface="Times New Roman"/>
-                        </a:rPr>
-                        <a:t> </a:t>
-                      </a:r>
-                      <a:r>
-                        <a:rPr sz="1050" spc="-15" dirty="0">
-                          <a:solidFill>
-                            <a:srgbClr val="4471C4"/>
-                          </a:solidFill>
-                          <a:latin typeface="Times New Roman"/>
-                          <a:cs typeface="Times New Roman"/>
-                        </a:rPr>
-                        <a:t>AWS</a:t>
-                      </a:r>
-                      <a:endParaRPr sz="1050">
-                        <a:latin typeface="Times New Roman"/>
-                        <a:cs typeface="Times New Roman"/>
-                      </a:endParaRPr>
-                    </a:p>
-                    <a:p>
-                      <a:pPr marL="315595">
-                        <a:lnSpc>
-                          <a:spcPts val="1255"/>
-                        </a:lnSpc>
-                        <a:spcBef>
-                          <a:spcPts val="15"/>
-                        </a:spcBef>
-                      </a:pPr>
-                      <a:r>
-                        <a:rPr sz="1050" spc="-5" dirty="0">
-                          <a:solidFill>
-                            <a:srgbClr val="4471C4"/>
-                          </a:solidFill>
-                          <a:latin typeface="Times New Roman"/>
-                          <a:cs typeface="Times New Roman"/>
-                        </a:rPr>
-                        <a:t>and</a:t>
-                      </a:r>
-                      <a:r>
-                        <a:rPr sz="1050" spc="-40" dirty="0">
-                          <a:solidFill>
-                            <a:srgbClr val="4471C4"/>
-                          </a:solidFill>
-                          <a:latin typeface="Times New Roman"/>
-                          <a:cs typeface="Times New Roman"/>
-                        </a:rPr>
-                        <a:t> </a:t>
-                      </a:r>
-                      <a:r>
-                        <a:rPr sz="1050" spc="-10" dirty="0">
-                          <a:solidFill>
-                            <a:srgbClr val="4471C4"/>
-                          </a:solidFill>
-                          <a:latin typeface="Times New Roman"/>
-                          <a:cs typeface="Times New Roman"/>
-                        </a:rPr>
-                        <a:t>Spring</a:t>
-                      </a:r>
-                      <a:endParaRPr sz="1050">
-                        <a:latin typeface="Times New Roman"/>
+                        <a:rPr lang="ko-KR" altLang="en-US" sz="1050" dirty="0" smtClean="0">
+                          <a:solidFill>
+                            <a:srgbClr val="4471C4"/>
+                          </a:solidFill>
+                          <a:latin typeface="+mj-lt"/>
+                          <a:cs typeface="Times New Roman"/>
+                        </a:rPr>
+                        <a:t>서버 구축</a:t>
+                      </a:r>
+                      <a:endParaRPr sz="1050" dirty="0">
+                        <a:latin typeface="+mj-lt"/>
                         <a:cs typeface="Times New Roman"/>
                       </a:endParaRPr>
                     </a:p>
@@ -22233,412 +21808,121 @@
                         </a:tabLst>
                       </a:pPr>
                       <a:r>
-                        <a:rPr sz="1050" spc="-15" dirty="0">
-                          <a:solidFill>
-                            <a:srgbClr val="4471C4"/>
-                          </a:solidFill>
-                          <a:latin typeface="Times New Roman"/>
-                          <a:cs typeface="Times New Roman"/>
-                        </a:rPr>
-                        <a:t>Developing</a:t>
-                      </a:r>
-                      <a:r>
-                        <a:rPr sz="1050" spc="75" dirty="0">
-                          <a:solidFill>
-                            <a:srgbClr val="4471C4"/>
-                          </a:solidFill>
-                          <a:latin typeface="Times New Roman"/>
-                          <a:cs typeface="Times New Roman"/>
-                        </a:rPr>
-                        <a:t> </a:t>
-                      </a:r>
-                      <a:r>
-                        <a:rPr sz="1050" dirty="0">
-                          <a:solidFill>
-                            <a:srgbClr val="4471C4"/>
-                          </a:solidFill>
-                          <a:latin typeface="Times New Roman"/>
-                          <a:cs typeface="Times New Roman"/>
-                        </a:rPr>
-                        <a:t>a</a:t>
-                      </a:r>
-                      <a:r>
-                        <a:rPr sz="1050" spc="-40" dirty="0">
-                          <a:solidFill>
-                            <a:srgbClr val="4471C4"/>
-                          </a:solidFill>
-                          <a:latin typeface="Times New Roman"/>
-                          <a:cs typeface="Times New Roman"/>
-                        </a:rPr>
-                        <a:t> </a:t>
-                      </a:r>
-                      <a:r>
-                        <a:rPr sz="1050" spc="-20" dirty="0">
-                          <a:solidFill>
-                            <a:srgbClr val="4471C4"/>
-                          </a:solidFill>
-                          <a:latin typeface="Times New Roman"/>
-                          <a:cs typeface="Times New Roman"/>
-                        </a:rPr>
-                        <a:t>filming</a:t>
-                      </a:r>
-                      <a:r>
-                        <a:rPr sz="1050" spc="80" dirty="0">
-                          <a:solidFill>
-                            <a:srgbClr val="4471C4"/>
-                          </a:solidFill>
-                          <a:latin typeface="Times New Roman"/>
-                          <a:cs typeface="Times New Roman"/>
-                        </a:rPr>
-                        <a:t> </a:t>
-                      </a:r>
-                      <a:r>
-                        <a:rPr sz="1050" spc="-15" dirty="0">
-                          <a:solidFill>
-                            <a:srgbClr val="4471C4"/>
-                          </a:solidFill>
-                          <a:latin typeface="Times New Roman"/>
-                          <a:cs typeface="Times New Roman"/>
-                        </a:rPr>
-                        <a:t>device</a:t>
-                      </a:r>
-                      <a:r>
-                        <a:rPr sz="1050" spc="35" dirty="0">
-                          <a:solidFill>
-                            <a:srgbClr val="4471C4"/>
-                          </a:solidFill>
-                          <a:latin typeface="Times New Roman"/>
-                          <a:cs typeface="Times New Roman"/>
-                        </a:rPr>
-                        <a:t> </a:t>
-                      </a:r>
-                      <a:r>
-                        <a:rPr sz="1050" spc="-5" dirty="0">
-                          <a:solidFill>
-                            <a:srgbClr val="4471C4"/>
-                          </a:solidFill>
-                          <a:latin typeface="Times New Roman"/>
-                          <a:cs typeface="Times New Roman"/>
-                        </a:rPr>
-                        <a:t>to</a:t>
-                      </a:r>
-                      <a:r>
-                        <a:rPr sz="1050" spc="-20" dirty="0">
-                          <a:solidFill>
-                            <a:srgbClr val="4471C4"/>
-                          </a:solidFill>
-                          <a:latin typeface="Times New Roman"/>
-                          <a:cs typeface="Times New Roman"/>
-                        </a:rPr>
-                        <a:t> </a:t>
-                      </a:r>
-                      <a:r>
-                        <a:rPr sz="1050" spc="-5" dirty="0">
-                          <a:solidFill>
-                            <a:srgbClr val="4471C4"/>
-                          </a:solidFill>
-                          <a:latin typeface="Times New Roman"/>
-                          <a:cs typeface="Times New Roman"/>
-                        </a:rPr>
-                        <a:t>replace</a:t>
-                      </a:r>
-                      <a:r>
-                        <a:rPr sz="1050" spc="-10" dirty="0">
-                          <a:solidFill>
-                            <a:srgbClr val="4471C4"/>
-                          </a:solidFill>
-                          <a:latin typeface="Times New Roman"/>
-                          <a:cs typeface="Times New Roman"/>
-                        </a:rPr>
-                        <a:t> </a:t>
-                      </a:r>
-                      <a:r>
-                        <a:rPr sz="1050" spc="-20" dirty="0">
-                          <a:solidFill>
-                            <a:srgbClr val="4471C4"/>
-                          </a:solidFill>
-                          <a:latin typeface="Times New Roman"/>
-                          <a:cs typeface="Times New Roman"/>
-                        </a:rPr>
-                        <a:t>embedded</a:t>
-                      </a:r>
-                      <a:endParaRPr sz="1050">
-                        <a:latin typeface="Times New Roman"/>
+                        <a:rPr lang="en-US" sz="1050" spc="-15" dirty="0" smtClean="0">
+                          <a:solidFill>
+                            <a:srgbClr val="4471C4"/>
+                          </a:solidFill>
+                          <a:latin typeface="+mj-lt"/>
+                          <a:cs typeface="Times New Roman"/>
+                        </a:rPr>
+                        <a:t>AI</a:t>
+                      </a:r>
+                      <a:r>
+                        <a:rPr lang="ko-KR" altLang="en-US" sz="1050" spc="-15" baseline="0" dirty="0" smtClean="0">
+                          <a:solidFill>
+                            <a:srgbClr val="4471C4"/>
+                          </a:solidFill>
+                          <a:latin typeface="+mj-lt"/>
+                          <a:cs typeface="Times New Roman"/>
+                        </a:rPr>
+                        <a:t> 모델의 성능을 위한 이미지 전처리 </a:t>
+                      </a:r>
+                      <a:r>
+                        <a:rPr lang="en-US" altLang="ko-KR" sz="1050" spc="-15" baseline="0" dirty="0" smtClean="0">
+                          <a:solidFill>
+                            <a:srgbClr val="4471C4"/>
+                          </a:solidFill>
+                          <a:latin typeface="+mj-lt"/>
+                          <a:cs typeface="Times New Roman"/>
+                        </a:rPr>
+                        <a:t>APP </a:t>
+                      </a:r>
+                      <a:r>
+                        <a:rPr lang="ko-KR" altLang="en-US" sz="1050" spc="-15" baseline="0" dirty="0" smtClean="0">
+                          <a:solidFill>
+                            <a:srgbClr val="4471C4"/>
+                          </a:solidFill>
+                          <a:latin typeface="+mj-lt"/>
+                          <a:cs typeface="Times New Roman"/>
+                        </a:rPr>
+                        <a:t>개발</a:t>
+                      </a:r>
+                      <a:endParaRPr lang="en-US" altLang="ko-KR" sz="1050" spc="-15" baseline="0" dirty="0" smtClean="0">
+                        <a:solidFill>
+                          <a:srgbClr val="4471C4"/>
+                        </a:solidFill>
+                        <a:latin typeface="+mj-lt"/>
                         <a:cs typeface="Times New Roman"/>
                       </a:endParaRPr>
                     </a:p>
                     <a:p>
-                      <a:pPr marL="315595">
+                      <a:pPr marL="315595" indent="-290195">
                         <a:lnSpc>
                           <a:spcPts val="1255"/>
                         </a:lnSpc>
-                        <a:spcBef>
-                          <a:spcPts val="10"/>
-                        </a:spcBef>
-                      </a:pPr>
-                      <a:r>
-                        <a:rPr sz="1050" spc="-15" dirty="0">
-                          <a:solidFill>
-                            <a:srgbClr val="4471C4"/>
-                          </a:solidFill>
-                          <a:latin typeface="Times New Roman"/>
-                          <a:cs typeface="Times New Roman"/>
-                        </a:rPr>
-                        <a:t>systems</a:t>
-                      </a:r>
-                      <a:r>
-                        <a:rPr sz="1050" spc="40" dirty="0">
-                          <a:solidFill>
-                            <a:srgbClr val="4471C4"/>
-                          </a:solidFill>
-                          <a:latin typeface="Times New Roman"/>
-                          <a:cs typeface="Times New Roman"/>
-                        </a:rPr>
-                        <a:t> </a:t>
-                      </a:r>
-                      <a:r>
-                        <a:rPr sz="1050" spc="-15" dirty="0">
-                          <a:solidFill>
-                            <a:srgbClr val="4471C4"/>
-                          </a:solidFill>
-                          <a:latin typeface="Times New Roman"/>
-                          <a:cs typeface="Times New Roman"/>
-                        </a:rPr>
-                        <a:t>through</a:t>
-                      </a:r>
-                      <a:r>
-                        <a:rPr sz="1050" spc="50" dirty="0">
-                          <a:solidFill>
-                            <a:srgbClr val="4471C4"/>
-                          </a:solidFill>
-                          <a:latin typeface="Times New Roman"/>
-                          <a:cs typeface="Times New Roman"/>
-                        </a:rPr>
-                        <a:t> </a:t>
-                      </a:r>
-                      <a:r>
-                        <a:rPr sz="1050" spc="-10" dirty="0">
-                          <a:solidFill>
-                            <a:srgbClr val="4471C4"/>
-                          </a:solidFill>
-                          <a:latin typeface="Times New Roman"/>
-                          <a:cs typeface="Times New Roman"/>
-                        </a:rPr>
-                        <a:t>cell</a:t>
-                      </a:r>
-                      <a:r>
-                        <a:rPr sz="1050" spc="-5" dirty="0">
-                          <a:solidFill>
-                            <a:srgbClr val="4471C4"/>
-                          </a:solidFill>
-                          <a:latin typeface="Times New Roman"/>
-                          <a:cs typeface="Times New Roman"/>
-                        </a:rPr>
-                        <a:t> </a:t>
-                      </a:r>
-                      <a:r>
-                        <a:rPr sz="1050" spc="-20" dirty="0">
-                          <a:solidFill>
-                            <a:srgbClr val="4471C4"/>
-                          </a:solidFill>
-                          <a:latin typeface="Times New Roman"/>
-                          <a:cs typeface="Times New Roman"/>
-                        </a:rPr>
-                        <a:t>phone</a:t>
-                      </a:r>
-                      <a:r>
-                        <a:rPr sz="1050" spc="55" dirty="0">
-                          <a:solidFill>
-                            <a:srgbClr val="4471C4"/>
-                          </a:solidFill>
-                          <a:latin typeface="Times New Roman"/>
-                          <a:cs typeface="Times New Roman"/>
-                        </a:rPr>
-                        <a:t> </a:t>
-                      </a:r>
-                      <a:r>
-                        <a:rPr sz="1050" spc="-5" dirty="0">
-                          <a:solidFill>
-                            <a:srgbClr val="4471C4"/>
-                          </a:solidFill>
-                          <a:latin typeface="Times New Roman"/>
-                          <a:cs typeface="Times New Roman"/>
-                        </a:rPr>
-                        <a:t>and</a:t>
-                      </a:r>
-                      <a:r>
-                        <a:rPr sz="1050" spc="-25" dirty="0">
-                          <a:solidFill>
-                            <a:srgbClr val="4471C4"/>
-                          </a:solidFill>
-                          <a:latin typeface="Times New Roman"/>
-                          <a:cs typeface="Times New Roman"/>
-                        </a:rPr>
-                        <a:t> </a:t>
-                      </a:r>
-                      <a:r>
-                        <a:rPr sz="1050" spc="-10" dirty="0">
-                          <a:solidFill>
-                            <a:srgbClr val="4471C4"/>
-                          </a:solidFill>
-                          <a:latin typeface="Times New Roman"/>
-                          <a:cs typeface="Times New Roman"/>
-                        </a:rPr>
-                        <a:t>camera</a:t>
-                      </a:r>
-                      <a:r>
-                        <a:rPr sz="1050" spc="15" dirty="0">
-                          <a:solidFill>
-                            <a:srgbClr val="4471C4"/>
-                          </a:solidFill>
-                          <a:latin typeface="Times New Roman"/>
-                          <a:cs typeface="Times New Roman"/>
-                        </a:rPr>
-                        <a:t> </a:t>
-                      </a:r>
-                      <a:r>
-                        <a:rPr sz="1050" spc="-15" dirty="0">
-                          <a:solidFill>
-                            <a:srgbClr val="4471C4"/>
-                          </a:solidFill>
-                          <a:latin typeface="Times New Roman"/>
-                          <a:cs typeface="Times New Roman"/>
-                        </a:rPr>
-                        <a:t>control</a:t>
-                      </a:r>
-                      <a:r>
-                        <a:rPr sz="1050" spc="20" dirty="0">
-                          <a:solidFill>
-                            <a:srgbClr val="4471C4"/>
-                          </a:solidFill>
-                          <a:latin typeface="Times New Roman"/>
-                          <a:cs typeface="Times New Roman"/>
-                        </a:rPr>
-                        <a:t> </a:t>
-                      </a:r>
-                      <a:r>
-                        <a:rPr sz="1050" spc="-20" dirty="0">
-                          <a:solidFill>
-                            <a:srgbClr val="4471C4"/>
-                          </a:solidFill>
-                          <a:latin typeface="Times New Roman"/>
-                          <a:cs typeface="Times New Roman"/>
-                        </a:rPr>
-                        <a:t>functions</a:t>
-                      </a:r>
-                      <a:endParaRPr sz="1050">
-                        <a:latin typeface="Times New Roman"/>
-                        <a:cs typeface="Times New Roman"/>
-                      </a:endParaRPr>
-                    </a:p>
-                    <a:p>
-                      <a:pPr marL="315595" indent="-281305">
-                        <a:lnSpc>
-                          <a:spcPts val="1255"/>
-                        </a:lnSpc>
-                        <a:buAutoNum type="arabicParenR" startAt="4"/>
+                        <a:buAutoNum type="arabicParenR" startAt="3"/>
                         <a:tabLst>
                           <a:tab pos="315595" algn="l"/>
                           <a:tab pos="316230" algn="l"/>
                         </a:tabLst>
                       </a:pPr>
                       <a:r>
-                        <a:rPr sz="1050" spc="-15" dirty="0">
-                          <a:solidFill>
-                            <a:srgbClr val="4471C4"/>
-                          </a:solidFill>
-                          <a:latin typeface="Times New Roman"/>
-                          <a:cs typeface="Times New Roman"/>
-                        </a:rPr>
-                        <a:t>Building</a:t>
-                      </a:r>
-                      <a:r>
-                        <a:rPr sz="1050" spc="45" dirty="0">
-                          <a:solidFill>
-                            <a:srgbClr val="4471C4"/>
-                          </a:solidFill>
-                          <a:latin typeface="Times New Roman"/>
-                          <a:cs typeface="Times New Roman"/>
-                        </a:rPr>
-                        <a:t> </a:t>
-                      </a:r>
-                      <a:r>
-                        <a:rPr sz="1050" spc="-10" dirty="0">
-                          <a:solidFill>
-                            <a:srgbClr val="4471C4"/>
-                          </a:solidFill>
-                          <a:latin typeface="Times New Roman"/>
-                          <a:cs typeface="Times New Roman"/>
-                        </a:rPr>
-                        <a:t>CI/CD</a:t>
-                      </a:r>
-                      <a:r>
-                        <a:rPr sz="1050" spc="-20" dirty="0">
-                          <a:solidFill>
-                            <a:srgbClr val="4471C4"/>
-                          </a:solidFill>
-                          <a:latin typeface="Times New Roman"/>
-                          <a:cs typeface="Times New Roman"/>
-                        </a:rPr>
-                        <a:t> </a:t>
-                      </a:r>
-                      <a:r>
-                        <a:rPr sz="1050" spc="-10" dirty="0">
-                          <a:solidFill>
-                            <a:srgbClr val="4471C4"/>
-                          </a:solidFill>
-                          <a:latin typeface="Times New Roman"/>
-                          <a:cs typeface="Times New Roman"/>
-                        </a:rPr>
-                        <a:t>using</a:t>
-                      </a:r>
-                      <a:r>
-                        <a:rPr sz="1050" spc="-25" dirty="0">
-                          <a:solidFill>
-                            <a:srgbClr val="4471C4"/>
-                          </a:solidFill>
-                          <a:latin typeface="Times New Roman"/>
-                          <a:cs typeface="Times New Roman"/>
-                        </a:rPr>
-                        <a:t> </a:t>
-                      </a:r>
-                      <a:r>
-                        <a:rPr sz="1050" spc="-20" dirty="0">
-                          <a:solidFill>
-                            <a:srgbClr val="4471C4"/>
-                          </a:solidFill>
-                          <a:latin typeface="Times New Roman"/>
-                          <a:cs typeface="Times New Roman"/>
-                        </a:rPr>
-                        <a:t>AWS</a:t>
-                      </a:r>
-                      <a:r>
-                        <a:rPr sz="1050" spc="-35" dirty="0">
-                          <a:solidFill>
-                            <a:srgbClr val="4471C4"/>
-                          </a:solidFill>
-                          <a:latin typeface="Times New Roman"/>
-                          <a:cs typeface="Times New Roman"/>
-                        </a:rPr>
-                        <a:t> </a:t>
-                      </a:r>
-                      <a:r>
-                        <a:rPr sz="1050" spc="-10" dirty="0">
-                          <a:solidFill>
-                            <a:srgbClr val="4471C4"/>
-                          </a:solidFill>
-                          <a:latin typeface="Times New Roman"/>
+                        <a:rPr lang="en-US" sz="1050" spc="-15" baseline="0" dirty="0" smtClean="0">
+                          <a:solidFill>
+                            <a:srgbClr val="4471C4"/>
+                          </a:solidFill>
+                          <a:latin typeface="+mj-lt"/>
+                          <a:cs typeface="Times New Roman"/>
+                        </a:rPr>
+                        <a:t>AWS </a:t>
+                      </a:r>
+                      <a:r>
+                        <a:rPr lang="en-US" altLang="ko-KR" sz="1050" spc="-10" dirty="0" err="1" smtClean="0">
+                          <a:solidFill>
+                            <a:srgbClr val="4471C4"/>
+                          </a:solidFill>
+                          <a:latin typeface="+mj-lt"/>
                           <a:cs typeface="Times New Roman"/>
                         </a:rPr>
                         <a:t>elasticbeanstalk</a:t>
                       </a:r>
-                      <a:endParaRPr sz="1050">
-                        <a:latin typeface="Times New Roman"/>
+                      <a:r>
+                        <a:rPr lang="ko-KR" altLang="en-US" sz="1050" spc="-10" dirty="0" smtClean="0">
+                          <a:solidFill>
+                            <a:srgbClr val="4471C4"/>
+                          </a:solidFill>
+                          <a:latin typeface="+mj-lt"/>
+                          <a:cs typeface="Times New Roman"/>
+                        </a:rPr>
+                        <a:t>을 이용한</a:t>
+                      </a:r>
+                      <a:r>
+                        <a:rPr lang="en-US" sz="1050" spc="-15" baseline="0" dirty="0" smtClean="0">
+                          <a:solidFill>
+                            <a:srgbClr val="4471C4"/>
+                          </a:solidFill>
+                          <a:latin typeface="+mj-lt"/>
+                          <a:cs typeface="Times New Roman"/>
+                        </a:rPr>
+                        <a:t> CI/CD </a:t>
+                      </a:r>
+                      <a:r>
+                        <a:rPr lang="ko-KR" altLang="en-US" sz="1050" spc="-15" baseline="0" dirty="0" smtClean="0">
+                          <a:solidFill>
+                            <a:srgbClr val="4471C4"/>
+                          </a:solidFill>
+                          <a:latin typeface="+mj-lt"/>
+                          <a:cs typeface="Times New Roman"/>
+                        </a:rPr>
+                        <a:t>구축</a:t>
+                      </a:r>
+                      <a:endParaRPr sz="1050" dirty="0">
+                        <a:latin typeface="+mj-lt"/>
                         <a:cs typeface="Times New Roman"/>
                       </a:endParaRPr>
                     </a:p>
                   </a:txBody>
-                  <a:tcPr marL="0" marR="0" marT="34925" marB="0">
+                  <a:tcPr marL="0" marR="0" marT="34925" marB="0" anchor="ctr">
                     <a:lnL w="9525">
                       <a:solidFill>
                         <a:srgbClr val="7E7E7E"/>
@@ -22681,174 +21965,174 @@
                       </a:pPr>
                       <a:r>
                         <a:rPr sz="1050" b="1" spc="-5" dirty="0">
-                          <a:latin typeface="Times New Roman"/>
+                          <a:latin typeface="+mj-lt"/>
                           <a:cs typeface="Times New Roman"/>
                         </a:rPr>
                         <a:t>Language, </a:t>
                       </a:r>
                       <a:r>
                         <a:rPr sz="1050" b="1" dirty="0">
-                          <a:latin typeface="Times New Roman"/>
+                          <a:latin typeface="+mj-lt"/>
                           <a:cs typeface="Times New Roman"/>
                         </a:rPr>
                         <a:t> </a:t>
                       </a:r>
                       <a:r>
                         <a:rPr sz="1050" b="1" spc="-15" dirty="0">
-                          <a:latin typeface="Times New Roman"/>
+                          <a:latin typeface="+mj-lt"/>
                           <a:cs typeface="Times New Roman"/>
                         </a:rPr>
                         <a:t>d</a:t>
                       </a:r>
                       <a:r>
                         <a:rPr sz="1050" b="1" spc="5" dirty="0">
-                          <a:latin typeface="Times New Roman"/>
+                          <a:latin typeface="+mj-lt"/>
                           <a:cs typeface="Times New Roman"/>
                         </a:rPr>
                         <a:t>e</a:t>
                       </a:r>
                       <a:r>
                         <a:rPr sz="1050" b="1" dirty="0">
-                          <a:latin typeface="Times New Roman"/>
+                          <a:latin typeface="+mj-lt"/>
                           <a:cs typeface="Times New Roman"/>
                         </a:rPr>
                         <a:t>v</a:t>
                       </a:r>
                       <a:r>
                         <a:rPr sz="1050" b="1" spc="5" dirty="0">
-                          <a:latin typeface="Times New Roman"/>
+                          <a:latin typeface="+mj-lt"/>
                           <a:cs typeface="Times New Roman"/>
                         </a:rPr>
                         <a:t>e</a:t>
                       </a:r>
                       <a:r>
                         <a:rPr sz="1050" b="1" spc="-10" dirty="0">
-                          <a:latin typeface="Times New Roman"/>
+                          <a:latin typeface="+mj-lt"/>
                           <a:cs typeface="Times New Roman"/>
                         </a:rPr>
                         <a:t>l</a:t>
                       </a:r>
                       <a:r>
                         <a:rPr sz="1050" b="1" spc="-30" dirty="0">
-                          <a:latin typeface="Times New Roman"/>
+                          <a:latin typeface="+mj-lt"/>
                           <a:cs typeface="Times New Roman"/>
                         </a:rPr>
                         <a:t>o</a:t>
                       </a:r>
                       <a:r>
                         <a:rPr sz="1050" b="1" spc="-15" dirty="0">
-                          <a:latin typeface="Times New Roman"/>
+                          <a:latin typeface="+mj-lt"/>
                           <a:cs typeface="Times New Roman"/>
                         </a:rPr>
                         <a:t>p</a:t>
                       </a:r>
                       <a:r>
                         <a:rPr sz="1050" b="1" spc="-20" dirty="0">
-                          <a:latin typeface="Times New Roman"/>
+                          <a:latin typeface="+mj-lt"/>
                           <a:cs typeface="Times New Roman"/>
                         </a:rPr>
                         <a:t>m</a:t>
                       </a:r>
                       <a:r>
                         <a:rPr sz="1050" b="1" spc="-15" dirty="0">
-                          <a:latin typeface="Times New Roman"/>
+                          <a:latin typeface="+mj-lt"/>
                           <a:cs typeface="Times New Roman"/>
                         </a:rPr>
                         <a:t>e</a:t>
                       </a:r>
                       <a:r>
                         <a:rPr sz="1050" b="1" spc="-40" dirty="0">
-                          <a:latin typeface="Times New Roman"/>
+                          <a:latin typeface="+mj-lt"/>
                           <a:cs typeface="Times New Roman"/>
                         </a:rPr>
                         <a:t>n</a:t>
                       </a:r>
                       <a:r>
                         <a:rPr sz="1050" b="1" dirty="0">
-                          <a:latin typeface="Times New Roman"/>
+                          <a:latin typeface="+mj-lt"/>
                           <a:cs typeface="Times New Roman"/>
                         </a:rPr>
                         <a:t>t  </a:t>
                       </a:r>
                       <a:r>
                         <a:rPr sz="1050" b="1" spc="10" dirty="0">
-                          <a:latin typeface="Times New Roman"/>
+                          <a:latin typeface="+mj-lt"/>
                           <a:cs typeface="Times New Roman"/>
                         </a:rPr>
                         <a:t>e</a:t>
                       </a:r>
                       <a:r>
                         <a:rPr sz="1050" b="1" spc="-35" dirty="0">
-                          <a:latin typeface="Times New Roman"/>
+                          <a:latin typeface="+mj-lt"/>
                           <a:cs typeface="Times New Roman"/>
                         </a:rPr>
                         <a:t>n</a:t>
                       </a:r>
                       <a:r>
                         <a:rPr sz="1050" b="1" dirty="0">
-                          <a:latin typeface="Times New Roman"/>
+                          <a:latin typeface="+mj-lt"/>
                           <a:cs typeface="Times New Roman"/>
                         </a:rPr>
                         <a:t>v</a:t>
                       </a:r>
                       <a:r>
                         <a:rPr sz="1050" b="1" spc="-10" dirty="0">
-                          <a:latin typeface="Times New Roman"/>
+                          <a:latin typeface="+mj-lt"/>
                           <a:cs typeface="Times New Roman"/>
                         </a:rPr>
                         <a:t>i</a:t>
                       </a:r>
                       <a:r>
                         <a:rPr sz="1050" b="1" spc="10" dirty="0">
-                          <a:latin typeface="Times New Roman"/>
+                          <a:latin typeface="+mj-lt"/>
                           <a:cs typeface="Times New Roman"/>
                         </a:rPr>
                         <a:t>r</a:t>
                       </a:r>
                       <a:r>
                         <a:rPr sz="1050" b="1" dirty="0">
-                          <a:latin typeface="Times New Roman"/>
+                          <a:latin typeface="+mj-lt"/>
                           <a:cs typeface="Times New Roman"/>
                         </a:rPr>
                         <a:t>o</a:t>
                       </a:r>
                       <a:r>
                         <a:rPr sz="1050" b="1" spc="-35" dirty="0">
-                          <a:latin typeface="Times New Roman"/>
+                          <a:latin typeface="+mj-lt"/>
                           <a:cs typeface="Times New Roman"/>
                         </a:rPr>
                         <a:t>n</a:t>
                       </a:r>
                       <a:r>
                         <a:rPr sz="1050" b="1" spc="-20" dirty="0">
-                          <a:latin typeface="Times New Roman"/>
+                          <a:latin typeface="+mj-lt"/>
                           <a:cs typeface="Times New Roman"/>
                         </a:rPr>
                         <a:t>m</a:t>
                       </a:r>
                       <a:r>
                         <a:rPr sz="1050" b="1" spc="10" dirty="0">
-                          <a:latin typeface="Times New Roman"/>
+                          <a:latin typeface="+mj-lt"/>
                           <a:cs typeface="Times New Roman"/>
                         </a:rPr>
                         <a:t>e</a:t>
                       </a:r>
                       <a:r>
                         <a:rPr sz="1050" b="1" spc="-35" dirty="0">
-                          <a:latin typeface="Times New Roman"/>
+                          <a:latin typeface="+mj-lt"/>
                           <a:cs typeface="Times New Roman"/>
                         </a:rPr>
                         <a:t>n</a:t>
                       </a:r>
                       <a:r>
                         <a:rPr sz="1050" b="1" dirty="0">
-                          <a:latin typeface="Times New Roman"/>
+                          <a:latin typeface="+mj-lt"/>
                           <a:cs typeface="Times New Roman"/>
                         </a:rPr>
                         <a:t>t</a:t>
                       </a:r>
                       <a:endParaRPr sz="1050">
-                        <a:latin typeface="Times New Roman"/>
+                        <a:latin typeface="+mj-lt"/>
                         <a:cs typeface="Times New Roman"/>
                       </a:endParaRPr>
                     </a:p>
@@ -22892,7 +22176,7 @@
                           <a:solidFill>
                             <a:srgbClr val="4471C4"/>
                           </a:solidFill>
-                          <a:latin typeface="Times New Roman"/>
+                          <a:latin typeface="+mj-lt"/>
                           <a:cs typeface="Times New Roman"/>
                         </a:rPr>
                         <a:t>F</a:t>
@@ -22902,7 +22186,7 @@
                           <a:solidFill>
                             <a:srgbClr val="4471C4"/>
                           </a:solidFill>
-                          <a:latin typeface="Times New Roman"/>
+                          <a:latin typeface="+mj-lt"/>
                           <a:cs typeface="Times New Roman"/>
                         </a:rPr>
                         <a:t>l</a:t>
@@ -22912,7 +22196,7 @@
                           <a:solidFill>
                             <a:srgbClr val="4471C4"/>
                           </a:solidFill>
-                          <a:latin typeface="Times New Roman"/>
+                          <a:latin typeface="+mj-lt"/>
                           <a:cs typeface="Times New Roman"/>
                         </a:rPr>
                         <a:t>u</a:t>
@@ -22922,7 +22206,7 @@
                           <a:solidFill>
                             <a:srgbClr val="4471C4"/>
                           </a:solidFill>
-                          <a:latin typeface="Times New Roman"/>
+                          <a:latin typeface="+mj-lt"/>
                           <a:cs typeface="Times New Roman"/>
                         </a:rPr>
                         <a:t>tt</a:t>
@@ -22932,7 +22216,7 @@
                           <a:solidFill>
                             <a:srgbClr val="4471C4"/>
                           </a:solidFill>
-                          <a:latin typeface="Times New Roman"/>
+                          <a:latin typeface="+mj-lt"/>
                           <a:cs typeface="Times New Roman"/>
                         </a:rPr>
                         <a:t>e</a:t>
@@ -22942,7 +22226,7 @@
                           <a:solidFill>
                             <a:srgbClr val="4471C4"/>
                           </a:solidFill>
-                          <a:latin typeface="Times New Roman"/>
+                          <a:latin typeface="+mj-lt"/>
                           <a:cs typeface="Times New Roman"/>
                         </a:rPr>
                         <a:t>r</a:t>
@@ -22952,7 +22236,7 @@
                           <a:solidFill>
                             <a:srgbClr val="4471C4"/>
                           </a:solidFill>
-                          <a:latin typeface="Times New Roman"/>
+                          <a:latin typeface="+mj-lt"/>
                           <a:cs typeface="Times New Roman"/>
                         </a:rPr>
                         <a:t>,</a:t>
@@ -22962,7 +22246,7 @@
                           <a:solidFill>
                             <a:srgbClr val="4471C4"/>
                           </a:solidFill>
-                          <a:latin typeface="Times New Roman"/>
+                          <a:latin typeface="+mj-lt"/>
                           <a:cs typeface="Times New Roman"/>
                         </a:rPr>
                         <a:t> </a:t>
@@ -22972,7 +22256,7 @@
                           <a:solidFill>
                             <a:srgbClr val="4471C4"/>
                           </a:solidFill>
-                          <a:latin typeface="Times New Roman"/>
+                          <a:latin typeface="+mj-lt"/>
                           <a:cs typeface="Times New Roman"/>
                         </a:rPr>
                         <a:t>d</a:t>
@@ -22982,7 +22266,7 @@
                           <a:solidFill>
                             <a:srgbClr val="4471C4"/>
                           </a:solidFill>
-                          <a:latin typeface="Times New Roman"/>
+                          <a:latin typeface="+mj-lt"/>
                           <a:cs typeface="Times New Roman"/>
                         </a:rPr>
                         <a:t>a</a:t>
@@ -22992,7 +22276,7 @@
                           <a:solidFill>
                             <a:srgbClr val="4471C4"/>
                           </a:solidFill>
-                          <a:latin typeface="Times New Roman"/>
+                          <a:latin typeface="+mj-lt"/>
                           <a:cs typeface="Times New Roman"/>
                         </a:rPr>
                         <a:t>r</a:t>
@@ -23002,7 +22286,7 @@
                           <a:solidFill>
                             <a:srgbClr val="4471C4"/>
                           </a:solidFill>
-                          <a:latin typeface="Times New Roman"/>
+                          <a:latin typeface="+mj-lt"/>
                           <a:cs typeface="Times New Roman"/>
                         </a:rPr>
                         <a:t>t</a:t>
@@ -23012,7 +22296,7 @@
                           <a:solidFill>
                             <a:srgbClr val="4471C4"/>
                           </a:solidFill>
-                          <a:latin typeface="Times New Roman"/>
+                          <a:latin typeface="+mj-lt"/>
                           <a:cs typeface="Times New Roman"/>
                         </a:rPr>
                         <a:t>,</a:t>
@@ -23022,7 +22306,7 @@
                           <a:solidFill>
                             <a:srgbClr val="4471C4"/>
                           </a:solidFill>
-                          <a:latin typeface="Times New Roman"/>
+                          <a:latin typeface="+mj-lt"/>
                           <a:cs typeface="Times New Roman"/>
                         </a:rPr>
                         <a:t> </a:t>
@@ -23032,7 +22316,7 @@
                           <a:solidFill>
                             <a:srgbClr val="4471C4"/>
                           </a:solidFill>
-                          <a:latin typeface="Times New Roman"/>
+                          <a:latin typeface="+mj-lt"/>
                           <a:cs typeface="Times New Roman"/>
                         </a:rPr>
                         <a:t>A</a:t>
@@ -23042,7 +22326,7 @@
                           <a:solidFill>
                             <a:srgbClr val="4471C4"/>
                           </a:solidFill>
-                          <a:latin typeface="Times New Roman"/>
+                          <a:latin typeface="+mj-lt"/>
                           <a:cs typeface="Times New Roman"/>
                         </a:rPr>
                         <a:t>W</a:t>
@@ -23052,7 +22336,7 @@
                           <a:solidFill>
                             <a:srgbClr val="4471C4"/>
                           </a:solidFill>
-                          <a:latin typeface="Times New Roman"/>
+                          <a:latin typeface="+mj-lt"/>
                           <a:cs typeface="Times New Roman"/>
                         </a:rPr>
                         <a:t>S</a:t>
@@ -23062,7 +22346,7 @@
                           <a:solidFill>
                             <a:srgbClr val="4471C4"/>
                           </a:solidFill>
-                          <a:latin typeface="Times New Roman"/>
+                          <a:latin typeface="+mj-lt"/>
                           <a:cs typeface="Times New Roman"/>
                         </a:rPr>
                         <a:t>,</a:t>
@@ -23072,7 +22356,7 @@
                           <a:solidFill>
                             <a:srgbClr val="4471C4"/>
                           </a:solidFill>
-                          <a:latin typeface="Times New Roman"/>
+                          <a:latin typeface="+mj-lt"/>
                           <a:cs typeface="Times New Roman"/>
                         </a:rPr>
                         <a:t> </a:t>
@@ -23082,7 +22366,7 @@
                           <a:solidFill>
                             <a:srgbClr val="4471C4"/>
                           </a:solidFill>
-                          <a:latin typeface="Times New Roman"/>
+                          <a:latin typeface="+mj-lt"/>
                           <a:cs typeface="Times New Roman"/>
                         </a:rPr>
                         <a:t>e</a:t>
@@ -23092,7 +22376,7 @@
                           <a:solidFill>
                             <a:srgbClr val="4471C4"/>
                           </a:solidFill>
-                          <a:latin typeface="Times New Roman"/>
+                          <a:latin typeface="+mj-lt"/>
                           <a:cs typeface="Times New Roman"/>
                         </a:rPr>
                         <a:t>l</a:t>
@@ -23102,7 +22386,7 @@
                           <a:solidFill>
                             <a:srgbClr val="4471C4"/>
                           </a:solidFill>
-                          <a:latin typeface="Times New Roman"/>
+                          <a:latin typeface="+mj-lt"/>
                           <a:cs typeface="Times New Roman"/>
                         </a:rPr>
                         <a:t>a</a:t>
@@ -23112,7 +22396,7 @@
                           <a:solidFill>
                             <a:srgbClr val="4471C4"/>
                           </a:solidFill>
-                          <a:latin typeface="Times New Roman"/>
+                          <a:latin typeface="+mj-lt"/>
                           <a:cs typeface="Times New Roman"/>
                         </a:rPr>
                         <a:t>s</a:t>
@@ -23122,7 +22406,7 @@
                           <a:solidFill>
                             <a:srgbClr val="4471C4"/>
                           </a:solidFill>
-                          <a:latin typeface="Times New Roman"/>
+                          <a:latin typeface="+mj-lt"/>
                           <a:cs typeface="Times New Roman"/>
                         </a:rPr>
                         <a:t>ti</a:t>
@@ -23132,7 +22416,7 @@
                           <a:solidFill>
                             <a:srgbClr val="4471C4"/>
                           </a:solidFill>
-                          <a:latin typeface="Times New Roman"/>
+                          <a:latin typeface="+mj-lt"/>
                           <a:cs typeface="Times New Roman"/>
                         </a:rPr>
                         <a:t>c</a:t>
@@ -23142,7 +22426,7 @@
                           <a:solidFill>
                             <a:srgbClr val="4471C4"/>
                           </a:solidFill>
-                          <a:latin typeface="Times New Roman"/>
+                          <a:latin typeface="+mj-lt"/>
                           <a:cs typeface="Times New Roman"/>
                         </a:rPr>
                         <a:t>b</a:t>
@@ -23152,7 +22436,7 @@
                           <a:solidFill>
                             <a:srgbClr val="4471C4"/>
                           </a:solidFill>
-                          <a:latin typeface="Times New Roman"/>
+                          <a:latin typeface="+mj-lt"/>
                           <a:cs typeface="Times New Roman"/>
                         </a:rPr>
                         <a:t>e</a:t>
@@ -23162,7 +22446,7 @@
                           <a:solidFill>
                             <a:srgbClr val="4471C4"/>
                           </a:solidFill>
-                          <a:latin typeface="Times New Roman"/>
+                          <a:latin typeface="+mj-lt"/>
                           <a:cs typeface="Times New Roman"/>
                         </a:rPr>
                         <a:t>a</a:t>
@@ -23172,7 +22456,7 @@
                           <a:solidFill>
                             <a:srgbClr val="4471C4"/>
                           </a:solidFill>
-                          <a:latin typeface="Times New Roman"/>
+                          <a:latin typeface="+mj-lt"/>
                           <a:cs typeface="Times New Roman"/>
                         </a:rPr>
                         <a:t>n</a:t>
@@ -23182,7 +22466,7 @@
                           <a:solidFill>
                             <a:srgbClr val="4471C4"/>
                           </a:solidFill>
-                          <a:latin typeface="Times New Roman"/>
+                          <a:latin typeface="+mj-lt"/>
                           <a:cs typeface="Times New Roman"/>
                         </a:rPr>
                         <a:t>s</a:t>
@@ -23192,7 +22476,7 @@
                           <a:solidFill>
                             <a:srgbClr val="4471C4"/>
                           </a:solidFill>
-                          <a:latin typeface="Times New Roman"/>
+                          <a:latin typeface="+mj-lt"/>
                           <a:cs typeface="Times New Roman"/>
                         </a:rPr>
                         <a:t>t</a:t>
@@ -23202,7 +22486,7 @@
                           <a:solidFill>
                             <a:srgbClr val="4471C4"/>
                           </a:solidFill>
-                          <a:latin typeface="Times New Roman"/>
+                          <a:latin typeface="+mj-lt"/>
                           <a:cs typeface="Times New Roman"/>
                         </a:rPr>
                         <a:t>a</a:t>
@@ -23212,7 +22496,7 @@
                           <a:solidFill>
                             <a:srgbClr val="4471C4"/>
                           </a:solidFill>
-                          <a:latin typeface="Times New Roman"/>
+                          <a:latin typeface="+mj-lt"/>
                           <a:cs typeface="Times New Roman"/>
                         </a:rPr>
                         <a:t>l</a:t>
@@ -23222,7 +22506,7 @@
                           <a:solidFill>
                             <a:srgbClr val="4471C4"/>
                           </a:solidFill>
-                          <a:latin typeface="Times New Roman"/>
+                          <a:latin typeface="+mj-lt"/>
                           <a:cs typeface="Times New Roman"/>
                         </a:rPr>
                         <a:t>k</a:t>
@@ -23232,7 +22516,7 @@
                           <a:solidFill>
                             <a:srgbClr val="4471C4"/>
                           </a:solidFill>
-                          <a:latin typeface="Times New Roman"/>
+                          <a:latin typeface="+mj-lt"/>
                           <a:cs typeface="Times New Roman"/>
                         </a:rPr>
                         <a:t>,</a:t>
@@ -23242,7 +22526,7 @@
                           <a:solidFill>
                             <a:srgbClr val="4471C4"/>
                           </a:solidFill>
-                          <a:latin typeface="Times New Roman"/>
+                          <a:latin typeface="+mj-lt"/>
                           <a:cs typeface="Times New Roman"/>
                         </a:rPr>
                         <a:t> </a:t>
@@ -23252,7 +22536,7 @@
                           <a:solidFill>
                             <a:srgbClr val="4471C4"/>
                           </a:solidFill>
-                          <a:latin typeface="Times New Roman"/>
+                          <a:latin typeface="+mj-lt"/>
                           <a:cs typeface="Times New Roman"/>
                         </a:rPr>
                         <a:t>D</a:t>
@@ -23262,7 +22546,7 @@
                           <a:solidFill>
                             <a:srgbClr val="4471C4"/>
                           </a:solidFill>
-                          <a:latin typeface="Times New Roman"/>
+                          <a:latin typeface="+mj-lt"/>
                           <a:cs typeface="Times New Roman"/>
                         </a:rPr>
                         <a:t>o</a:t>
@@ -23272,7 +22556,7 @@
                           <a:solidFill>
                             <a:srgbClr val="4471C4"/>
                           </a:solidFill>
-                          <a:latin typeface="Times New Roman"/>
+                          <a:latin typeface="+mj-lt"/>
                           <a:cs typeface="Times New Roman"/>
                         </a:rPr>
                         <a:t>c</a:t>
@@ -23282,7 +22566,7 @@
                           <a:solidFill>
                             <a:srgbClr val="4471C4"/>
                           </a:solidFill>
-                          <a:latin typeface="Times New Roman"/>
+                          <a:latin typeface="+mj-lt"/>
                           <a:cs typeface="Times New Roman"/>
                         </a:rPr>
                         <a:t>k</a:t>
@@ -23292,7 +22576,7 @@
                           <a:solidFill>
                             <a:srgbClr val="4471C4"/>
                           </a:solidFill>
-                          <a:latin typeface="Times New Roman"/>
+                          <a:latin typeface="+mj-lt"/>
                           <a:cs typeface="Times New Roman"/>
                         </a:rPr>
                         <a:t>e</a:t>
@@ -23302,7 +22586,7 @@
                           <a:solidFill>
                             <a:srgbClr val="4471C4"/>
                           </a:solidFill>
-                          <a:latin typeface="Times New Roman"/>
+                          <a:latin typeface="+mj-lt"/>
                           <a:cs typeface="Times New Roman"/>
                         </a:rPr>
                         <a:t>r</a:t>
@@ -23312,7 +22596,7 @@
                           <a:solidFill>
                             <a:srgbClr val="4471C4"/>
                           </a:solidFill>
-                          <a:latin typeface="Times New Roman"/>
+                          <a:latin typeface="+mj-lt"/>
                           <a:cs typeface="Times New Roman"/>
                         </a:rPr>
                         <a:t>,</a:t>
@@ -23322,7 +22606,7 @@
                           <a:solidFill>
                             <a:srgbClr val="4471C4"/>
                           </a:solidFill>
-                          <a:latin typeface="Times New Roman"/>
+                          <a:latin typeface="+mj-lt"/>
                           <a:cs typeface="Times New Roman"/>
                         </a:rPr>
                         <a:t> </a:t>
@@ -23332,7 +22616,7 @@
                           <a:solidFill>
                             <a:srgbClr val="4471C4"/>
                           </a:solidFill>
-                          <a:latin typeface="Times New Roman"/>
+                          <a:latin typeface="+mj-lt"/>
                           <a:cs typeface="Times New Roman"/>
                         </a:rPr>
                         <a:t>J</a:t>
@@ -23342,7 +22626,7 @@
                           <a:solidFill>
                             <a:srgbClr val="4471C4"/>
                           </a:solidFill>
-                          <a:latin typeface="Times New Roman"/>
+                          <a:latin typeface="+mj-lt"/>
                           <a:cs typeface="Times New Roman"/>
                         </a:rPr>
                         <a:t>AVA</a:t>
@@ -23352,7 +22636,7 @@
                           <a:solidFill>
                             <a:srgbClr val="4471C4"/>
                           </a:solidFill>
-                          <a:latin typeface="Times New Roman"/>
+                          <a:latin typeface="+mj-lt"/>
                           <a:cs typeface="Times New Roman"/>
                         </a:rPr>
                         <a:t>, </a:t>
@@ -23362,7 +22646,7 @@
                           <a:solidFill>
                             <a:srgbClr val="4471C4"/>
                           </a:solidFill>
-                          <a:latin typeface="Times New Roman"/>
+                          <a:latin typeface="+mj-lt"/>
                           <a:cs typeface="Times New Roman"/>
                         </a:rPr>
                         <a:t>S</a:t>
@@ -23372,7 +22656,7 @@
                           <a:solidFill>
                             <a:srgbClr val="4471C4"/>
                           </a:solidFill>
-                          <a:latin typeface="Times New Roman"/>
+                          <a:latin typeface="+mj-lt"/>
                           <a:cs typeface="Times New Roman"/>
                         </a:rPr>
                         <a:t>p</a:t>
@@ -23382,7 +22666,7 @@
                           <a:solidFill>
                             <a:srgbClr val="4471C4"/>
                           </a:solidFill>
-                          <a:latin typeface="Times New Roman"/>
+                          <a:latin typeface="+mj-lt"/>
                           <a:cs typeface="Times New Roman"/>
                         </a:rPr>
                         <a:t>r</a:t>
@@ -23392,7 +22676,7 @@
                           <a:solidFill>
                             <a:srgbClr val="4471C4"/>
                           </a:solidFill>
-                          <a:latin typeface="Times New Roman"/>
+                          <a:latin typeface="+mj-lt"/>
                           <a:cs typeface="Times New Roman"/>
                         </a:rPr>
                         <a:t>i</a:t>
@@ -23402,7 +22686,7 @@
                           <a:solidFill>
                             <a:srgbClr val="4471C4"/>
                           </a:solidFill>
-                          <a:latin typeface="Times New Roman"/>
+                          <a:latin typeface="+mj-lt"/>
                           <a:cs typeface="Times New Roman"/>
                         </a:rPr>
                         <a:t>n</a:t>
@@ -23412,23 +22696,43 @@
                           <a:solidFill>
                             <a:srgbClr val="4471C4"/>
                           </a:solidFill>
-                          <a:latin typeface="Times New Roman"/>
+                          <a:latin typeface="+mj-lt"/>
                           <a:cs typeface="Times New Roman"/>
                         </a:rPr>
                         <a:t>g  </a:t>
                       </a:r>
                       <a:r>
-                        <a:rPr sz="1050" spc="-35" dirty="0">
-                          <a:solidFill>
-                            <a:srgbClr val="4471C4"/>
-                          </a:solidFill>
-                          <a:latin typeface="Times New Roman"/>
+                        <a:rPr sz="1050" spc="-35" dirty="0" smtClean="0">
+                          <a:solidFill>
+                            <a:srgbClr val="4471C4"/>
+                          </a:solidFill>
+                          <a:latin typeface="+mj-lt"/>
                           <a:cs typeface="Times New Roman"/>
                         </a:rPr>
                         <a:t>Boot</a:t>
                       </a:r>
-                      <a:endParaRPr sz="1050">
-                        <a:latin typeface="Times New Roman"/>
+                      <a:r>
+                        <a:rPr lang="en-US" sz="1050" spc="-35" dirty="0" smtClean="0">
+                          <a:solidFill>
+                            <a:srgbClr val="4471C4"/>
+                          </a:solidFill>
+                          <a:latin typeface="+mj-lt"/>
+                          <a:cs typeface="Times New Roman"/>
+                        </a:rPr>
+                        <a:t>, </a:t>
+                      </a:r>
+                      <a:r>
+                        <a:rPr lang="en-US" sz="1050" spc="-35" dirty="0" err="1" smtClean="0">
+                          <a:solidFill>
+                            <a:srgbClr val="4471C4"/>
+                          </a:solidFill>
+                          <a:latin typeface="+mj-lt"/>
+                          <a:cs typeface="Times New Roman"/>
+                        </a:rPr>
+                        <a:t>Figma</a:t>
+                      </a:r>
+                      <a:endParaRPr sz="1050" dirty="0">
+                        <a:latin typeface="+mj-lt"/>
                         <a:cs typeface="Times New Roman"/>
                       </a:endParaRPr>
                     </a:p>
@@ -23475,14 +22779,21 @@
                         </a:spcBef>
                       </a:pPr>
                       <a:r>
-                        <a:rPr sz="1050" b="1" spc="-10" dirty="0">
-                          <a:latin typeface="Times New Roman"/>
-                          <a:cs typeface="Times New Roman"/>
-                        </a:rPr>
-                        <a:t>reference</a:t>
-                      </a:r>
-                      <a:endParaRPr sz="1050">
-                        <a:latin typeface="Times New Roman"/>
+                        <a:rPr lang="en-US" sz="1050" b="1" spc="-10" dirty="0" smtClean="0">
+                          <a:latin typeface="+mj-lt"/>
+                          <a:cs typeface="Times New Roman"/>
+                        </a:rPr>
+                        <a:t>R</a:t>
+                      </a:r>
+                      <a:r>
+                        <a:rPr sz="1050" b="1" spc="-10" dirty="0" smtClean="0">
+                          <a:latin typeface="+mj-lt"/>
+                          <a:cs typeface="Times New Roman"/>
+                        </a:rPr>
+                        <a:t>eference</a:t>
+                      </a:r>
+                      <a:endParaRPr sz="1050" dirty="0">
+                        <a:latin typeface="+mj-lt"/>
                         <a:cs typeface="Times New Roman"/>
                       </a:endParaRPr>
                     </a:p>
@@ -23531,7 +22842,7 @@
                               <a:srgbClr val="0096A7"/>
                             </a:solidFill>
                           </a:uFill>
-                          <a:latin typeface="Times New Roman"/>
+                          <a:latin typeface="+mj-lt"/>
                           <a:cs typeface="Times New Roman"/>
                           <a:hlinkClick r:id="rId2"/>
                         </a:rPr>
@@ -23547,7 +22858,7 @@
                               <a:srgbClr val="0096A7"/>
                             </a:solidFill>
                           </a:uFill>
-                          <a:latin typeface="Times New Roman"/>
+                          <a:latin typeface="+mj-lt"/>
                           <a:cs typeface="Times New Roman"/>
                           <a:hlinkClick r:id="rId2"/>
                         </a:rPr>
@@ -23563,14 +22874,14 @@
                               <a:srgbClr val="0096A7"/>
                             </a:solidFill>
                           </a:uFill>
-                          <a:latin typeface="Times New Roman"/>
+                          <a:latin typeface="+mj-lt"/>
                           <a:cs typeface="Times New Roman"/>
                           <a:hlinkClick r:id="rId2"/>
                         </a:rPr>
                         <a:t>Link</a:t>
                       </a:r>
-                      <a:endParaRPr sz="1050">
-                        <a:latin typeface="Times New Roman"/>
+                      <a:endParaRPr sz="1050" dirty="0">
+                        <a:latin typeface="+mj-lt"/>
                         <a:cs typeface="Times New Roman"/>
                       </a:endParaRPr>
                     </a:p>
@@ -23665,20 +22976,22 @@
       </p:sp>
       <p:pic>
         <p:nvPicPr>
-          <p:cNvPr id="5" name="object 5"/>
-          <p:cNvPicPr/>
+          <p:cNvPr id="6" name="그림 5"/>
+          <p:cNvPicPr>
+            <a:picLocks noChangeAspect="1"/>
+          </p:cNvPicPr>
           <p:nvPr/>
         </p:nvPicPr>
         <p:blipFill>
-          <a:blip r:embed="rId3" cstate="print"/>
+          <a:blip r:embed="rId3"/>
           <a:stretch>
             <a:fillRect/>
           </a:stretch>
         </p:blipFill>
         <p:spPr>
           <a:xfrm>
-            <a:off x="134112" y="1319783"/>
-            <a:ext cx="3953255" cy="2465831"/>
+            <a:off x="119508" y="1736725"/>
+            <a:ext cx="4093574" cy="2620939"/>
           </a:xfrm>
           <a:prstGeom prst="rect">
             <a:avLst/>
@@ -23823,7 +23136,7 @@
               </a:rPr>
               <a:t>01.</a:t>
             </a:r>
-            <a:endParaRPr sz="2100">
+            <a:endParaRPr sz="2100" dirty="0">
               <a:latin typeface="Arial MT"/>
               <a:cs typeface="Arial MT"/>
             </a:endParaRPr>

</xml_diff>